<commit_message>
Added slides about my probable contribution
</commit_message>
<xml_diff>
--- a/presentation.pptx
+++ b/presentation.pptx
@@ -5,7 +5,7 @@
     <p:sldMasterId id="2147483648" r:id="rId1"/>
   </p:sldMasterIdLst>
   <p:notesMasterIdLst>
-    <p:notesMasterId r:id="rId15"/>
+    <p:notesMasterId r:id="rId16"/>
   </p:notesMasterIdLst>
   <p:sldIdLst>
     <p:sldId id="256" r:id="rId2"/>
@@ -18,9 +18,10 @@
     <p:sldId id="266" r:id="rId9"/>
     <p:sldId id="272" r:id="rId10"/>
     <p:sldId id="267" r:id="rId11"/>
-    <p:sldId id="271" r:id="rId12"/>
-    <p:sldId id="268" r:id="rId13"/>
-    <p:sldId id="269" r:id="rId14"/>
+    <p:sldId id="274" r:id="rId12"/>
+    <p:sldId id="271" r:id="rId13"/>
+    <p:sldId id="268" r:id="rId14"/>
+    <p:sldId id="269" r:id="rId15"/>
   </p:sldIdLst>
   <p:sldSz cx="9144000" cy="6858000" type="screen4x3"/>
   <p:notesSz cx="6858000" cy="9144000"/>
@@ -277,7 +278,7 @@
               <a:pPr>
                 <a:defRPr/>
               </a:pPr>
-              <a:t>11/12/2016</a:t>
+              <a:t>11/14/2016</a:t>
             </a:fld>
             <a:endParaRPr lang="en-US"/>
           </a:p>
@@ -1120,7 +1121,7 @@
               <a:pPr>
                 <a:defRPr/>
               </a:pPr>
-              <a:t>11</a:t>
+              <a:t>12</a:t>
             </a:fld>
             <a:endParaRPr lang="en-US"/>
           </a:p>
@@ -1563,7 +1564,7 @@
             </a:pPr>
             <a:fld id="{B95CCD0E-0695-40D8-9A46-F693866F34C0}" type="datetime5">
               <a:rPr lang="en-US" smtClean="0"/>
-              <a:t>13-Nov-16</a:t>
+              <a:t>14-Nov-16</a:t>
             </a:fld>
             <a:endParaRPr lang="en-US"/>
           </a:p>
@@ -1774,7 +1775,7 @@
             </a:pPr>
             <a:fld id="{9CA67BDA-2B39-4562-8FEF-26CB1D5EC69C}" type="datetime5">
               <a:rPr lang="en-US" smtClean="0"/>
-              <a:t>13-Nov-16</a:t>
+              <a:t>14-Nov-16</a:t>
             </a:fld>
             <a:endParaRPr lang="en-US"/>
           </a:p>
@@ -1976,7 +1977,7 @@
             </a:pPr>
             <a:fld id="{90402F7C-E1B4-4EEF-8EAC-2DC6FF75E124}" type="datetime5">
               <a:rPr lang="en-US" smtClean="0"/>
-              <a:t>13-Nov-16</a:t>
+              <a:t>14-Nov-16</a:t>
             </a:fld>
             <a:endParaRPr lang="en-US"/>
           </a:p>
@@ -2440,7 +2441,7 @@
             </a:pPr>
             <a:fld id="{8D8EC1B1-678F-4353-B339-B32CD0B6B2EE}" type="datetime5">
               <a:rPr lang="en-US" smtClean="0"/>
-              <a:t>13-Nov-16</a:t>
+              <a:t>14-Nov-16</a:t>
             </a:fld>
             <a:endParaRPr lang="en-US"/>
           </a:p>
@@ -2727,7 +2728,7 @@
             </a:pPr>
             <a:fld id="{0A6314FE-947B-4C62-AFD9-865701E0787A}" type="datetime5">
               <a:rPr lang="en-US" smtClean="0"/>
-              <a:t>13-Nov-16</a:t>
+              <a:t>14-Nov-16</a:t>
             </a:fld>
             <a:endParaRPr lang="en-US"/>
           </a:p>
@@ -3307,7 +3308,7 @@
             </a:pPr>
             <a:fld id="{D93FB54F-99C1-4EAE-96D1-205A70D33FA0}" type="datetime5">
               <a:rPr lang="en-US" smtClean="0"/>
-              <a:t>13-Nov-16</a:t>
+              <a:t>14-Nov-16</a:t>
             </a:fld>
             <a:endParaRPr lang="en-US"/>
           </a:p>
@@ -4035,7 +4036,7 @@
             </a:pPr>
             <a:fld id="{2B70D84A-2810-4E03-B637-D1C23EA2DC0E}" type="datetime5">
               <a:rPr lang="en-US" smtClean="0"/>
-              <a:t>13-Nov-16</a:t>
+              <a:t>14-Nov-16</a:t>
             </a:fld>
             <a:endParaRPr lang="en-US"/>
           </a:p>
@@ -4471,7 +4472,7 @@
             </a:pPr>
             <a:fld id="{A02FB751-A013-40AD-8468-76A1C0A073BF}" type="datetime5">
               <a:rPr lang="en-US" smtClean="0"/>
-              <a:t>13-Nov-16</a:t>
+              <a:t>14-Nov-16</a:t>
             </a:fld>
             <a:endParaRPr lang="en-US"/>
           </a:p>
@@ -4801,7 +4802,7 @@
             </a:pPr>
             <a:fld id="{74C79B44-033C-4863-B3C5-CADF4B60E8D8}" type="datetime5">
               <a:rPr lang="en-US" smtClean="0"/>
-              <a:t>13-Nov-16</a:t>
+              <a:t>14-Nov-16</a:t>
             </a:fld>
             <a:endParaRPr lang="en-US"/>
           </a:p>
@@ -5118,7 +5119,7 @@
             </a:pPr>
             <a:fld id="{1C6C9EC6-6038-4D3A-BEE7-6F3B0EC2A9E8}" type="datetime5">
               <a:rPr lang="en-US" smtClean="0"/>
-              <a:t>13-Nov-16</a:t>
+              <a:t>14-Nov-16</a:t>
             </a:fld>
             <a:endParaRPr lang="en-US"/>
           </a:p>
@@ -5400,7 +5401,7 @@
             </a:pPr>
             <a:fld id="{4B89CB4A-2697-433E-BF41-B14E4BD2B40C}" type="datetime5">
               <a:rPr lang="en-US" smtClean="0"/>
-              <a:t>13-Nov-16</a:t>
+              <a:t>14-Nov-16</a:t>
             </a:fld>
             <a:endParaRPr lang="en-US"/>
           </a:p>
@@ -5656,7 +5657,7 @@
             </a:pPr>
             <a:fld id="{D42D1055-E9A1-4521-AC5F-D38EF75C250B}" type="datetime5">
               <a:rPr lang="en-US" smtClean="0"/>
-              <a:t>13-Nov-16</a:t>
+              <a:t>14-Nov-16</a:t>
             </a:fld>
             <a:endParaRPr lang="en-US"/>
           </a:p>
@@ -6302,7 +6303,7 @@
             </a:pPr>
             <a:fld id="{8E517C41-1FF7-4556-93EB-1042E97E7846}" type="datetime5">
               <a:rPr lang="en-US" smtClean="0"/>
-              <a:t>13-Nov-16</a:t>
+              <a:t>14-Nov-16</a:t>
             </a:fld>
             <a:endParaRPr lang="en-US"/>
           </a:p>
@@ -6534,7 +6535,7 @@
             </a:pPr>
             <a:fld id="{D6BE58A1-A4A9-468D-9971-E4F582D1F085}" type="datetime5">
               <a:rPr lang="en-US" smtClean="0"/>
-              <a:t>13-Nov-16</a:t>
+              <a:t>14-Nov-16</a:t>
             </a:fld>
             <a:endParaRPr lang="en-US"/>
           </a:p>
@@ -6621,217 +6622,85 @@
           <a:bodyPr/>
           <a:lstStyle/>
           <a:p>
-            <a:pPr>
-              <a:buFont typeface="Wingdings" panose="05000000000000000000" pitchFamily="2" charset="2"/>
-              <a:buChar char="Ø"/>
+            <a:pPr marL="0" indent="0">
+              <a:buNone/>
             </a:pPr>
-            <a:endParaRPr lang="en-US" sz="1800" b="1" dirty="0"/>
-          </a:p>
-          <a:p>
-            <a:pPr>
-              <a:buFont typeface="Wingdings" panose="05000000000000000000" pitchFamily="2" charset="2"/>
-              <a:buChar char="Ø"/>
-            </a:pPr>
-            <a:r>
-              <a:rPr lang="en-US" sz="1800" b="1" dirty="0"/>
-              <a:t>Sentiment Analysis on Movie </a:t>
-            </a:r>
-            <a:r>
-              <a:rPr lang="en-US" sz="1800" b="1" dirty="0" smtClean="0"/>
-              <a:t>Reviews </a:t>
-            </a:r>
-          </a:p>
-          <a:p>
-            <a:pPr lvl="1">
-              <a:buFont typeface="Wingdings" panose="05000000000000000000" pitchFamily="2" charset="2"/>
-              <a:buChar char="Ø"/>
-            </a:pPr>
-            <a:r>
-              <a:rPr lang="en-US" sz="1400" b="1" i="1" dirty="0" smtClean="0"/>
-              <a:t>[IJARCST, Vol 3, Issue 1, pp 41-46] (journal) </a:t>
-            </a:r>
-          </a:p>
-          <a:p>
-            <a:pPr>
-              <a:buFont typeface="Wingdings" panose="05000000000000000000" pitchFamily="2" charset="2"/>
-              <a:buChar char="Ø"/>
-            </a:pPr>
-            <a:r>
-              <a:rPr lang="en-US" sz="1800" b="1" dirty="0"/>
-              <a:t>Recommendation System based on Product Purchase </a:t>
-            </a:r>
-            <a:r>
-              <a:rPr lang="en-US" sz="1800" b="1" dirty="0" smtClean="0"/>
-              <a:t>Analysis</a:t>
-            </a:r>
-            <a:endParaRPr lang="en-US" sz="1800" b="1" dirty="0"/>
-          </a:p>
-          <a:p>
-            <a:pPr lvl="1">
-              <a:buFont typeface="Wingdings" panose="05000000000000000000" pitchFamily="2" charset="2"/>
-              <a:buChar char="Ø"/>
-            </a:pPr>
-            <a:r>
-              <a:rPr lang="en-US" sz="1400" b="1" i="1" dirty="0" smtClean="0"/>
-              <a:t>[ISSE</a:t>
-            </a:r>
-            <a:r>
-              <a:rPr lang="en-US" sz="1400" b="1" i="1" dirty="0"/>
-              <a:t>, Springer London, ISSN:1614-5054, Vol 12, Issue 3, pp 177-192] (NASA journal</a:t>
-            </a:r>
-            <a:r>
-              <a:rPr lang="en-US" sz="1400" b="1" i="1" dirty="0" smtClean="0"/>
-              <a:t>)</a:t>
-            </a:r>
-            <a:endParaRPr lang="en-US" sz="1400" b="1" i="1" dirty="0"/>
-          </a:p>
-          <a:p>
-            <a:pPr lvl="1">
-              <a:buFont typeface="Wingdings" panose="05000000000000000000" pitchFamily="2" charset="2"/>
-              <a:buChar char="Ø"/>
-            </a:pPr>
-            <a:r>
-              <a:rPr lang="en-US" sz="1400" b="1" i="1" dirty="0" smtClean="0"/>
-              <a:t>[</a:t>
-            </a:r>
-            <a:r>
-              <a:rPr lang="en-US" sz="1400" b="1" i="1" dirty="0"/>
-              <a:t>ICACNI, SIST Springer, ISBN: 978-81-322-2538-6, Vol 43, pp 581-591] (conference)</a:t>
-            </a:r>
-            <a:r>
-              <a:rPr lang="en-US" sz="1400" b="1" dirty="0"/>
-              <a:t> </a:t>
-            </a:r>
-            <a:endParaRPr lang="en-US" sz="1400" b="1" dirty="0" smtClean="0"/>
-          </a:p>
-          <a:p>
-            <a:pPr>
-              <a:buFont typeface="Wingdings" panose="05000000000000000000" pitchFamily="2" charset="2"/>
-              <a:buChar char="Ø"/>
-            </a:pPr>
-            <a:r>
-              <a:rPr lang="en-US" sz="1800" b="1" dirty="0"/>
-              <a:t>Extraction &amp; Analysis of Publication Data of Conferences </a:t>
-            </a:r>
-            <a:endParaRPr lang="en-US" sz="1800" b="1" dirty="0" smtClean="0"/>
-          </a:p>
-          <a:p>
-            <a:pPr lvl="1">
-              <a:buFont typeface="Wingdings" panose="05000000000000000000" pitchFamily="2" charset="2"/>
-              <a:buChar char="Ø"/>
-            </a:pPr>
-            <a:r>
-              <a:rPr lang="en-US" sz="1400" b="1" i="1" dirty="0" smtClean="0"/>
-              <a:t>[</a:t>
-            </a:r>
-            <a:r>
-              <a:rPr lang="en-US" sz="1400" b="1" i="1" dirty="0"/>
-              <a:t>IEEE </a:t>
-            </a:r>
-            <a:r>
-              <a:rPr lang="en-US" sz="1400" b="1" i="1" dirty="0" smtClean="0"/>
-              <a:t>International Conference </a:t>
-            </a:r>
-            <a:r>
-              <a:rPr lang="en-US" sz="1400" b="1" i="1" dirty="0"/>
-              <a:t>on Advances in Computing &amp; Communication Engineering-2015, pp </a:t>
-            </a:r>
-            <a:r>
-              <a:rPr lang="en-US" sz="1400" b="1" i="1" dirty="0" smtClean="0"/>
-              <a:t>588-593]</a:t>
-            </a:r>
-          </a:p>
-          <a:p>
-            <a:pPr>
-              <a:buFont typeface="Wingdings" panose="05000000000000000000" pitchFamily="2" charset="2"/>
-              <a:buChar char="Ø"/>
-            </a:pPr>
-            <a:r>
-              <a:rPr lang="en-US" sz="1800" b="1" dirty="0"/>
-              <a:t>Analysis of Computer Science publications </a:t>
-            </a:r>
-            <a:endParaRPr lang="en-US" sz="1800" b="1" dirty="0" smtClean="0"/>
-          </a:p>
-          <a:p>
-            <a:pPr lvl="1">
-              <a:buFont typeface="Wingdings" panose="05000000000000000000" pitchFamily="2" charset="2"/>
-              <a:buChar char="Ø"/>
-            </a:pPr>
-            <a:r>
-              <a:rPr lang="en-US" sz="1400" b="1" i="1" dirty="0" smtClean="0"/>
-              <a:t>[</a:t>
-            </a:r>
-            <a:r>
-              <a:rPr lang="en-US" sz="1400" b="1" i="1" dirty="0"/>
-              <a:t>WIS &amp; COLLNET 2015] (poster)</a:t>
-            </a:r>
-            <a:r>
-              <a:rPr lang="en-US" sz="1400" b="1" dirty="0"/>
-              <a:t> </a:t>
-            </a:r>
-            <a:br>
-              <a:rPr lang="en-US" sz="1400" b="1" dirty="0"/>
-            </a:br>
-            <a:r>
-              <a:rPr lang="en-US" sz="1400" b="1" dirty="0" smtClean="0"/>
-              <a:t> </a:t>
-            </a:r>
-            <a:r>
-              <a:rPr lang="en-US" sz="1400" b="1" dirty="0"/>
-              <a:t/>
-            </a:r>
-            <a:br>
-              <a:rPr lang="en-US" sz="1400" b="1" dirty="0"/>
-            </a:br>
-            <a:r>
-              <a:rPr lang="en-US" sz="1400" b="1" dirty="0"/>
-              <a:t/>
-            </a:r>
-            <a:br>
-              <a:rPr lang="en-US" sz="1400" b="1" dirty="0"/>
-            </a:br>
-            <a:r>
-              <a:rPr lang="en-US" sz="1400" b="1" dirty="0"/>
-              <a:t/>
-            </a:r>
-            <a:br>
-              <a:rPr lang="en-US" sz="1400" b="1" dirty="0"/>
-            </a:br>
-            <a:endParaRPr lang="en-US" sz="1400" b="1" dirty="0"/>
-          </a:p>
-          <a:p>
-            <a:pPr>
-              <a:buFont typeface="Wingdings" panose="05000000000000000000" pitchFamily="2" charset="2"/>
-              <a:buChar char="Ø"/>
-            </a:pPr>
-            <a:endParaRPr lang="en-US" sz="1800" b="1" dirty="0"/>
-          </a:p>
-        </p:txBody>
-      </p:sp>
-      <p:sp>
-        <p:nvSpPr>
-          <p:cNvPr id="3" name="Title 2"/>
-          <p:cNvSpPr>
-            <a:spLocks noGrp="1"/>
-          </p:cNvSpPr>
-          <p:nvPr>
-            <p:ph type="title"/>
-          </p:nvPr>
-        </p:nvSpPr>
-        <p:spPr/>
-        <p:txBody>
-          <a:bodyPr/>
-          <a:lstStyle/>
-          <a:p>
-            <a:r>
-              <a:rPr lang="en-US" dirty="0" smtClean="0"/>
-              <a:t>My Relevant Experience </a:t>
-            </a:r>
-            <a:r>
-              <a:rPr lang="en-US" dirty="0" smtClean="0">
+            <a:endParaRPr lang="en-US" sz="2000" dirty="0"/>
+          </a:p>
+          <a:p>
+            <a:r>
+              <a:rPr lang="en-US" sz="2000" b="1" dirty="0" smtClean="0"/>
+              <a:t>Content summarizer</a:t>
+            </a:r>
+            <a:r>
+              <a:rPr lang="en-US" sz="2000" dirty="0" smtClean="0"/>
+              <a:t> (120 words) for news articles published in ET, TOI </a:t>
+            </a:r>
+            <a:endParaRPr lang="en-US" sz="2000" dirty="0"/>
+          </a:p>
+          <a:p>
+            <a:r>
+              <a:rPr lang="en-US" sz="2000" b="1" dirty="0" smtClean="0"/>
+              <a:t>Personalized news feeds</a:t>
+            </a:r>
+          </a:p>
+          <a:p>
+            <a:r>
+              <a:rPr lang="en-US" sz="2000" dirty="0" smtClean="0"/>
+              <a:t>Text to Voice (</a:t>
+            </a:r>
+            <a:r>
+              <a:rPr lang="en-US" sz="2000" b="1" dirty="0" smtClean="0"/>
+              <a:t>News Reader</a:t>
+            </a:r>
+            <a:r>
+              <a:rPr lang="en-US" sz="2000" dirty="0" smtClean="0"/>
+              <a:t>) [May be in future!]</a:t>
+            </a:r>
+          </a:p>
+          <a:p>
+            <a:r>
+              <a:rPr lang="en-US" sz="2000" b="1" dirty="0" smtClean="0"/>
+              <a:t>Sentiment Analysis </a:t>
+            </a:r>
+            <a:r>
+              <a:rPr lang="en-US" sz="2000" dirty="0" smtClean="0"/>
+              <a:t>of users’ comments about news articles, movies etc.</a:t>
+            </a:r>
+          </a:p>
+          <a:p>
+            <a:r>
+              <a:rPr lang="en-US" sz="2000" dirty="0" smtClean="0"/>
+              <a:t>And much more!!! </a:t>
+            </a:r>
+            <a:r>
+              <a:rPr lang="en-US" sz="2000" b="1" dirty="0" smtClean="0">
                 <a:sym typeface="Wingdings" panose="05000000000000000000" pitchFamily="2" charset="2"/>
               </a:rPr>
               <a:t></a:t>
+            </a:r>
+            <a:endParaRPr lang="en-US" sz="2000" b="1" dirty="0"/>
+          </a:p>
+        </p:txBody>
+      </p:sp>
+      <p:sp>
+        <p:nvSpPr>
+          <p:cNvPr id="3" name="Title 2"/>
+          <p:cNvSpPr>
+            <a:spLocks noGrp="1"/>
+          </p:cNvSpPr>
+          <p:nvPr>
+            <p:ph type="title"/>
+          </p:nvPr>
+        </p:nvSpPr>
+        <p:spPr/>
+        <p:txBody>
+          <a:bodyPr/>
+          <a:lstStyle/>
+          <a:p>
+            <a:r>
+              <a:rPr lang="en-US" dirty="0" smtClean="0"/>
+              <a:t>How can I contribute?</a:t>
             </a:r>
             <a:endParaRPr lang="en-US" dirty="0"/>
           </a:p>
@@ -6899,7 +6768,7 @@
             </a:pPr>
             <a:fld id="{D6BE58A1-A4A9-468D-9971-E4F582D1F085}" type="datetime5">
               <a:rPr lang="en-US" smtClean="0"/>
-              <a:t>13-Nov-16</a:t>
+              <a:t>14-Nov-16</a:t>
             </a:fld>
             <a:endParaRPr lang="en-US"/>
           </a:p>
@@ -6934,10 +6803,56 @@
           </a:p>
         </p:txBody>
       </p:sp>
+      <p:sp>
+        <p:nvSpPr>
+          <p:cNvPr id="4" name="TextBox 3"/>
+          <p:cNvSpPr txBox="1"/>
+          <p:nvPr/>
+        </p:nvSpPr>
+        <p:spPr>
+          <a:xfrm>
+            <a:off x="133289" y="6126163"/>
+            <a:ext cx="9202327" cy="338554"/>
+          </a:xfrm>
+          <a:prstGeom prst="rect">
+            <a:avLst/>
+          </a:prstGeom>
+          <a:noFill/>
+        </p:spPr>
+        <p:txBody>
+          <a:bodyPr wrap="none" rtlCol="0">
+            <a:spAutoFit/>
+          </a:bodyPr>
+          <a:lstStyle/>
+          <a:p>
+            <a:r>
+              <a:rPr lang="en-US" sz="1600" dirty="0" smtClean="0"/>
+              <a:t>NOTE: I am covering only these products because I am an avid user of them (TOI, ET, </a:t>
+            </a:r>
+            <a:r>
+              <a:rPr lang="en-US" sz="1600" dirty="0" err="1" smtClean="0"/>
+              <a:t>Ei</a:t>
+            </a:r>
+            <a:r>
+              <a:rPr lang="en-US" sz="1600" dirty="0" smtClean="0"/>
+              <a:t> </a:t>
+            </a:r>
+            <a:r>
+              <a:rPr lang="en-US" sz="1600" dirty="0" err="1" smtClean="0"/>
+              <a:t>Samay</a:t>
+            </a:r>
+            <a:r>
+              <a:rPr lang="en-US" sz="1600" dirty="0" smtClean="0"/>
+              <a:t>) ! </a:t>
+            </a:r>
+            <a:endParaRPr lang="en-US" sz="1600" dirty="0"/>
+          </a:p>
+        </p:txBody>
+      </p:sp>
     </p:spTree>
     <p:extLst>
       <p:ext uri="{BB962C8B-B14F-4D97-AF65-F5344CB8AC3E}">
-        <p14:creationId xmlns:p14="http://schemas.microsoft.com/office/powerpoint/2010/main" val="3923813446"/>
+        <p14:creationId xmlns:p14="http://schemas.microsoft.com/office/powerpoint/2010/main" val="105635196"/>
       </p:ext>
     </p:extLst>
   </p:cSld>
@@ -6971,35 +6886,208 @@
           <a:chExt cx="0" cy="0"/>
         </a:xfrm>
       </p:grpSpPr>
-      <p:pic>
-        <p:nvPicPr>
-          <p:cNvPr id="4" name="Content Placeholder 3"/>
-          <p:cNvPicPr>
-            <a:picLocks noGrp="1" noChangeAspect="1"/>
-          </p:cNvPicPr>
+      <p:sp>
+        <p:nvSpPr>
+          <p:cNvPr id="2" name="Content Placeholder 1"/>
+          <p:cNvSpPr>
+            <a:spLocks noGrp="1"/>
+          </p:cNvSpPr>
           <p:nvPr>
             <p:ph idx="1"/>
           </p:nvPr>
-        </p:nvPicPr>
-        <p:blipFill>
-          <a:blip r:embed="rId2">
-            <a:extLst>
-              <a:ext uri="{28A0092B-C50C-407E-A947-70E740481C1C}">
-                <a14:useLocalDpi xmlns:a14="http://schemas.microsoft.com/office/drawing/2010/main" val="0"/>
-              </a:ext>
-            </a:extLst>
-          </a:blip>
-          <a:stretch>
-            <a:fillRect/>
-          </a:stretch>
-        </p:blipFill>
-        <p:spPr>
-          <a:xfrm>
-            <a:off x="2352675" y="1453356"/>
-            <a:ext cx="4286250" cy="4286250"/>
-          </a:xfrm>
-        </p:spPr>
-      </p:pic>
+        </p:nvSpPr>
+        <p:spPr/>
+        <p:txBody>
+          <a:bodyPr/>
+          <a:lstStyle/>
+          <a:p>
+            <a:pPr>
+              <a:buFont typeface="Wingdings" panose="05000000000000000000" pitchFamily="2" charset="2"/>
+              <a:buChar char="Ø"/>
+            </a:pPr>
+            <a:endParaRPr lang="en-US" sz="1800" b="1" dirty="0"/>
+          </a:p>
+          <a:p>
+            <a:pPr>
+              <a:buFont typeface="Wingdings" panose="05000000000000000000" pitchFamily="2" charset="2"/>
+              <a:buChar char="Ø"/>
+            </a:pPr>
+            <a:r>
+              <a:rPr lang="en-US" sz="1800" b="1" dirty="0"/>
+              <a:t>Sentiment Analysis on Movie </a:t>
+            </a:r>
+            <a:r>
+              <a:rPr lang="en-US" sz="1800" b="1" dirty="0" smtClean="0"/>
+              <a:t>Reviews </a:t>
+            </a:r>
+          </a:p>
+          <a:p>
+            <a:pPr lvl="1">
+              <a:buFont typeface="Wingdings" panose="05000000000000000000" pitchFamily="2" charset="2"/>
+              <a:buChar char="Ø"/>
+            </a:pPr>
+            <a:r>
+              <a:rPr lang="en-US" sz="1400" b="1" i="1" dirty="0" smtClean="0"/>
+              <a:t>[IJARCST, Vol 3, Issue 1, pp 41-46] (journal) </a:t>
+            </a:r>
+          </a:p>
+          <a:p>
+            <a:pPr>
+              <a:buFont typeface="Wingdings" panose="05000000000000000000" pitchFamily="2" charset="2"/>
+              <a:buChar char="Ø"/>
+            </a:pPr>
+            <a:r>
+              <a:rPr lang="en-US" sz="1800" b="1" dirty="0"/>
+              <a:t>Recommendation System based on Product Purchase </a:t>
+            </a:r>
+            <a:r>
+              <a:rPr lang="en-US" sz="1800" b="1" dirty="0" smtClean="0"/>
+              <a:t>Analysis</a:t>
+            </a:r>
+            <a:endParaRPr lang="en-US" sz="1800" b="1" dirty="0"/>
+          </a:p>
+          <a:p>
+            <a:pPr lvl="1">
+              <a:buFont typeface="Wingdings" panose="05000000000000000000" pitchFamily="2" charset="2"/>
+              <a:buChar char="Ø"/>
+            </a:pPr>
+            <a:r>
+              <a:rPr lang="en-US" sz="1400" b="1" i="1" dirty="0" smtClean="0"/>
+              <a:t>[ISSE</a:t>
+            </a:r>
+            <a:r>
+              <a:rPr lang="en-US" sz="1400" b="1" i="1" dirty="0"/>
+              <a:t>, Springer London, ISSN:1614-5054, Vol 12, Issue 3, pp 177-192] (NASA journal</a:t>
+            </a:r>
+            <a:r>
+              <a:rPr lang="en-US" sz="1400" b="1" i="1" dirty="0" smtClean="0"/>
+              <a:t>)</a:t>
+            </a:r>
+            <a:endParaRPr lang="en-US" sz="1400" b="1" i="1" dirty="0"/>
+          </a:p>
+          <a:p>
+            <a:pPr lvl="1">
+              <a:buFont typeface="Wingdings" panose="05000000000000000000" pitchFamily="2" charset="2"/>
+              <a:buChar char="Ø"/>
+            </a:pPr>
+            <a:r>
+              <a:rPr lang="en-US" sz="1400" b="1" i="1" dirty="0" smtClean="0"/>
+              <a:t>[</a:t>
+            </a:r>
+            <a:r>
+              <a:rPr lang="en-US" sz="1400" b="1" i="1" dirty="0"/>
+              <a:t>ICACNI, SIST Springer, ISBN: 978-81-322-2538-6, Vol 43, pp 581-591] (conference)</a:t>
+            </a:r>
+            <a:r>
+              <a:rPr lang="en-US" sz="1400" b="1" dirty="0"/>
+              <a:t> </a:t>
+            </a:r>
+            <a:endParaRPr lang="en-US" sz="1400" b="1" dirty="0" smtClean="0"/>
+          </a:p>
+          <a:p>
+            <a:pPr>
+              <a:buFont typeface="Wingdings" panose="05000000000000000000" pitchFamily="2" charset="2"/>
+              <a:buChar char="Ø"/>
+            </a:pPr>
+            <a:r>
+              <a:rPr lang="en-US" sz="1800" b="1" dirty="0"/>
+              <a:t>Extraction &amp; Analysis of Publication Data of Conferences </a:t>
+            </a:r>
+            <a:endParaRPr lang="en-US" sz="1800" b="1" dirty="0" smtClean="0"/>
+          </a:p>
+          <a:p>
+            <a:pPr lvl="1">
+              <a:buFont typeface="Wingdings" panose="05000000000000000000" pitchFamily="2" charset="2"/>
+              <a:buChar char="Ø"/>
+            </a:pPr>
+            <a:r>
+              <a:rPr lang="en-US" sz="1400" b="1" i="1" dirty="0" smtClean="0"/>
+              <a:t>[</a:t>
+            </a:r>
+            <a:r>
+              <a:rPr lang="en-US" sz="1400" b="1" i="1" dirty="0"/>
+              <a:t>IEEE </a:t>
+            </a:r>
+            <a:r>
+              <a:rPr lang="en-US" sz="1400" b="1" i="1" dirty="0" smtClean="0"/>
+              <a:t>International Conference </a:t>
+            </a:r>
+            <a:r>
+              <a:rPr lang="en-US" sz="1400" b="1" i="1" dirty="0"/>
+              <a:t>on Advances in Computing &amp; Communication Engineering-2015, pp </a:t>
+            </a:r>
+            <a:r>
+              <a:rPr lang="en-US" sz="1400" b="1" i="1" dirty="0" smtClean="0"/>
+              <a:t>588-593]</a:t>
+            </a:r>
+          </a:p>
+          <a:p>
+            <a:pPr>
+              <a:buFont typeface="Wingdings" panose="05000000000000000000" pitchFamily="2" charset="2"/>
+              <a:buChar char="Ø"/>
+            </a:pPr>
+            <a:r>
+              <a:rPr lang="en-US" sz="1800" b="1" dirty="0"/>
+              <a:t>Analysis of Computer Science publications </a:t>
+            </a:r>
+            <a:endParaRPr lang="en-US" sz="1800" b="1" dirty="0" smtClean="0"/>
+          </a:p>
+          <a:p>
+            <a:pPr lvl="1">
+              <a:buFont typeface="Wingdings" panose="05000000000000000000" pitchFamily="2" charset="2"/>
+              <a:buChar char="Ø"/>
+            </a:pPr>
+            <a:r>
+              <a:rPr lang="en-US" sz="1400" b="1" i="1" dirty="0" smtClean="0"/>
+              <a:t>[</a:t>
+            </a:r>
+            <a:r>
+              <a:rPr lang="en-US" sz="1400" b="1" i="1" dirty="0"/>
+              <a:t>WIS &amp; COLLNET 2015] (poster)</a:t>
+            </a:r>
+            <a:r>
+              <a:rPr lang="en-US" sz="1400" b="1" dirty="0"/>
+              <a:t> </a:t>
+            </a:r>
+            <a:br>
+              <a:rPr lang="en-US" sz="1400" b="1" dirty="0"/>
+            </a:br>
+            <a:r>
+              <a:rPr lang="en-US" sz="1400" b="1" dirty="0" smtClean="0"/>
+              <a:t> </a:t>
+            </a:r>
+            <a:r>
+              <a:rPr lang="en-US" sz="1400" b="1" dirty="0"/>
+              <a:t/>
+            </a:r>
+            <a:br>
+              <a:rPr lang="en-US" sz="1400" b="1" dirty="0"/>
+            </a:br>
+            <a:r>
+              <a:rPr lang="en-US" sz="1400" b="1" dirty="0"/>
+              <a:t/>
+            </a:r>
+            <a:br>
+              <a:rPr lang="en-US" sz="1400" b="1" dirty="0"/>
+            </a:br>
+            <a:r>
+              <a:rPr lang="en-US" sz="1400" b="1" dirty="0"/>
+              <a:t/>
+            </a:r>
+            <a:br>
+              <a:rPr lang="en-US" sz="1400" b="1" dirty="0"/>
+            </a:br>
+            <a:endParaRPr lang="en-US" sz="1400" b="1" dirty="0"/>
+          </a:p>
+          <a:p>
+            <a:pPr>
+              <a:buFont typeface="Wingdings" panose="05000000000000000000" pitchFamily="2" charset="2"/>
+              <a:buChar char="Ø"/>
+            </a:pPr>
+            <a:endParaRPr lang="en-US" sz="1800" b="1" dirty="0"/>
+          </a:p>
+        </p:txBody>
+      </p:sp>
       <p:sp>
         <p:nvSpPr>
           <p:cNvPr id="3" name="Title 2"/>
@@ -7017,7 +7105,13 @@
           <a:p>
             <a:r>
               <a:rPr lang="en-US" dirty="0" smtClean="0"/>
-              <a:t>Questions?</a:t>
+              <a:t>My Relevant Experience </a:t>
+            </a:r>
+            <a:r>
+              <a:rPr lang="en-US" dirty="0" smtClean="0">
+                <a:sym typeface="Wingdings" panose="05000000000000000000" pitchFamily="2" charset="2"/>
+              </a:rPr>
+              <a:t></a:t>
             </a:r>
             <a:endParaRPr lang="en-US" dirty="0"/>
           </a:p>
@@ -7085,7 +7179,7 @@
             </a:pPr>
             <a:fld id="{D6BE58A1-A4A9-468D-9971-E4F582D1F085}" type="datetime5">
               <a:rPr lang="en-US" smtClean="0"/>
-              <a:t>13-Nov-16</a:t>
+              <a:t>14-Nov-16</a:t>
             </a:fld>
             <a:endParaRPr lang="en-US"/>
           </a:p>
@@ -7123,7 +7217,7 @@
     </p:spTree>
     <p:extLst>
       <p:ext uri="{BB962C8B-B14F-4D97-AF65-F5344CB8AC3E}">
-        <p14:creationId xmlns:p14="http://schemas.microsoft.com/office/powerpoint/2010/main" val="55439111"/>
+        <p14:creationId xmlns:p14="http://schemas.microsoft.com/office/powerpoint/2010/main" val="3923813446"/>
       </p:ext>
     </p:extLst>
   </p:cSld>
@@ -7168,6 +7262,192 @@
           </p:nvPr>
         </p:nvPicPr>
         <p:blipFill>
+          <a:blip r:embed="rId2">
+            <a:extLst>
+              <a:ext uri="{28A0092B-C50C-407E-A947-70E740481C1C}">
+                <a14:useLocalDpi xmlns:a14="http://schemas.microsoft.com/office/drawing/2010/main" val="0"/>
+              </a:ext>
+            </a:extLst>
+          </a:blip>
+          <a:stretch>
+            <a:fillRect/>
+          </a:stretch>
+        </p:blipFill>
+        <p:spPr>
+          <a:xfrm>
+            <a:off x="2352675" y="1453356"/>
+            <a:ext cx="4286250" cy="4286250"/>
+          </a:xfrm>
+        </p:spPr>
+      </p:pic>
+      <p:sp>
+        <p:nvSpPr>
+          <p:cNvPr id="3" name="Title 2"/>
+          <p:cNvSpPr>
+            <a:spLocks noGrp="1"/>
+          </p:cNvSpPr>
+          <p:nvPr>
+            <p:ph type="title"/>
+          </p:nvPr>
+        </p:nvSpPr>
+        <p:spPr/>
+        <p:txBody>
+          <a:bodyPr/>
+          <a:lstStyle/>
+          <a:p>
+            <a:r>
+              <a:rPr lang="en-US" dirty="0" smtClean="0"/>
+              <a:t>Questions?</a:t>
+            </a:r>
+            <a:endParaRPr lang="en-US" dirty="0"/>
+          </a:p>
+        </p:txBody>
+      </p:sp>
+      <p:sp>
+        <p:nvSpPr>
+          <p:cNvPr id="9" name="TextBox 8"/>
+          <p:cNvSpPr txBox="1"/>
+          <p:nvPr/>
+        </p:nvSpPr>
+        <p:spPr>
+          <a:xfrm>
+            <a:off x="3429000" y="6553200"/>
+            <a:ext cx="1066800" cy="276999"/>
+          </a:xfrm>
+          <a:prstGeom prst="rect">
+            <a:avLst/>
+          </a:prstGeom>
+          <a:solidFill>
+            <a:schemeClr val="tx1"/>
+          </a:solidFill>
+        </p:spPr>
+        <p:txBody>
+          <a:bodyPr wrap="square" rtlCol="0">
+            <a:spAutoFit/>
+          </a:bodyPr>
+          <a:lstStyle/>
+          <a:p>
+            <a:r>
+              <a:rPr lang="en-US" sz="1200" dirty="0" smtClean="0">
+                <a:solidFill>
+                  <a:schemeClr val="bg1"/>
+                </a:solidFill>
+                <a:latin typeface="+mn-lt"/>
+              </a:rPr>
+              <a:t>Sohom Ghosh</a:t>
+            </a:r>
+            <a:endParaRPr lang="en-US" sz="1200" dirty="0">
+              <a:solidFill>
+                <a:schemeClr val="bg1"/>
+              </a:solidFill>
+              <a:latin typeface="+mn-lt"/>
+            </a:endParaRPr>
+          </a:p>
+        </p:txBody>
+      </p:sp>
+      <p:sp>
+        <p:nvSpPr>
+          <p:cNvPr id="10" name="Date Placeholder 9"/>
+          <p:cNvSpPr>
+            <a:spLocks noGrp="1"/>
+          </p:cNvSpPr>
+          <p:nvPr>
+            <p:ph type="dt" sz="half" idx="10"/>
+          </p:nvPr>
+        </p:nvSpPr>
+        <p:spPr/>
+        <p:txBody>
+          <a:bodyPr/>
+          <a:lstStyle/>
+          <a:p>
+            <a:pPr>
+              <a:defRPr/>
+            </a:pPr>
+            <a:fld id="{D6BE58A1-A4A9-468D-9971-E4F582D1F085}" type="datetime5">
+              <a:rPr lang="en-US" smtClean="0"/>
+              <a:t>14-Nov-16</a:t>
+            </a:fld>
+            <a:endParaRPr lang="en-US"/>
+          </a:p>
+        </p:txBody>
+      </p:sp>
+      <p:sp>
+        <p:nvSpPr>
+          <p:cNvPr id="11" name="Slide Number Placeholder 10"/>
+          <p:cNvSpPr>
+            <a:spLocks noGrp="1"/>
+          </p:cNvSpPr>
+          <p:nvPr>
+            <p:ph type="sldNum" sz="quarter" idx="12"/>
+          </p:nvPr>
+        </p:nvSpPr>
+        <p:spPr/>
+        <p:txBody>
+          <a:bodyPr/>
+          <a:lstStyle/>
+          <a:p>
+            <a:pPr>
+              <a:defRPr/>
+            </a:pPr>
+            <a:fld id="{5BC7FEBF-A170-470C-A369-F0D066FB58E5}" type="slidenum">
+              <a:rPr lang="en-US" smtClean="0"/>
+              <a:pPr>
+                <a:defRPr/>
+              </a:pPr>
+              <a:t>13</a:t>
+            </a:fld>
+            <a:endParaRPr lang="en-US"/>
+          </a:p>
+        </p:txBody>
+      </p:sp>
+    </p:spTree>
+    <p:extLst>
+      <p:ext uri="{BB962C8B-B14F-4D97-AF65-F5344CB8AC3E}">
+        <p14:creationId xmlns:p14="http://schemas.microsoft.com/office/powerpoint/2010/main" val="55439111"/>
+      </p:ext>
+    </p:extLst>
+  </p:cSld>
+  <p:clrMapOvr>
+    <a:masterClrMapping/>
+  </p:clrMapOvr>
+  <p:timing>
+    <p:tnLst>
+      <p:par>
+        <p:cTn id="1" dur="indefinite" restart="never" nodeType="tmRoot"/>
+      </p:par>
+    </p:tnLst>
+  </p:timing>
+</p:sld>
+</file>
+
+<file path=ppt/slides/slide14.xml><?xml version="1.0" encoding="utf-8"?>
+<p:sld xmlns:a="http://schemas.openxmlformats.org/drawingml/2006/main" xmlns:r="http://schemas.openxmlformats.org/officeDocument/2006/relationships" xmlns:p="http://schemas.openxmlformats.org/presentationml/2006/main">
+  <p:cSld>
+    <p:spTree>
+      <p:nvGrpSpPr>
+        <p:cNvPr id="1" name=""/>
+        <p:cNvGrpSpPr/>
+        <p:nvPr/>
+      </p:nvGrpSpPr>
+      <p:grpSpPr>
+        <a:xfrm>
+          <a:off x="0" y="0"/>
+          <a:ext cx="0" cy="0"/>
+          <a:chOff x="0" y="0"/>
+          <a:chExt cx="0" cy="0"/>
+        </a:xfrm>
+      </p:grpSpPr>
+      <p:pic>
+        <p:nvPicPr>
+          <p:cNvPr id="4" name="Content Placeholder 3"/>
+          <p:cNvPicPr>
+            <a:picLocks noGrp="1" noChangeAspect="1"/>
+          </p:cNvPicPr>
+          <p:nvPr>
+            <p:ph idx="1"/>
+          </p:nvPr>
+        </p:nvPicPr>
+        <p:blipFill>
           <a:blip r:embed="rId2" cstate="print">
             <a:extLst>
               <a:ext uri="{28A0092B-C50C-407E-A947-70E740481C1C}">
@@ -7271,7 +7551,7 @@
             </a:pPr>
             <a:fld id="{D6BE58A1-A4A9-468D-9971-E4F582D1F085}" type="datetime5">
               <a:rPr lang="en-US" smtClean="0"/>
-              <a:t>13-Nov-16</a:t>
+              <a:t>14-Nov-16</a:t>
             </a:fld>
             <a:endParaRPr lang="en-US"/>
           </a:p>
@@ -7300,7 +7580,7 @@
               <a:pPr>
                 <a:defRPr/>
               </a:pPr>
-              <a:t>13</a:t>
+              <a:t>14</a:t>
             </a:fld>
             <a:endParaRPr lang="en-US"/>
           </a:p>
@@ -7419,7 +7699,7 @@
             </a:pPr>
             <a:fld id="{D6BE58A1-A4A9-468D-9971-E4F582D1F085}" type="datetime5">
               <a:rPr lang="en-US" smtClean="0"/>
-              <a:t>13-Nov-16</a:t>
+              <a:t>14-Nov-16</a:t>
             </a:fld>
             <a:endParaRPr lang="en-US"/>
           </a:p>
@@ -7814,7 +8094,7 @@
             </a:pPr>
             <a:fld id="{D6BE58A1-A4A9-468D-9971-E4F582D1F085}" type="datetime5">
               <a:rPr lang="en-US" smtClean="0"/>
-              <a:t>13-Nov-16</a:t>
+              <a:t>14-Nov-16</a:t>
             </a:fld>
             <a:endParaRPr lang="en-US"/>
           </a:p>
@@ -7912,7 +8192,6 @@
               <a:rPr lang="en-US" sz="2400" dirty="0" smtClean="0"/>
               <a:t>Removed common terms like “services”, special characters and white spaces</a:t>
             </a:r>
-            <a:endParaRPr lang="en-US" sz="2400" dirty="0" smtClean="0"/>
           </a:p>
           <a:p>
             <a:pPr lvl="1"/>
@@ -8000,7 +8279,6 @@
               <a:rPr lang="en-US" dirty="0" smtClean="0"/>
               <a:t>vectors</a:t>
             </a:r>
-            <a:endParaRPr lang="en-US" dirty="0" smtClean="0"/>
           </a:p>
         </p:txBody>
       </p:sp>
@@ -8089,7 +8367,7 @@
             </a:pPr>
             <a:fld id="{D6BE58A1-A4A9-468D-9971-E4F582D1F085}" type="datetime5">
               <a:rPr lang="en-US" smtClean="0"/>
-              <a:t>13-Nov-16</a:t>
+              <a:t>14-Nov-16</a:t>
             </a:fld>
             <a:endParaRPr lang="en-US"/>
           </a:p>
@@ -8185,11 +8463,7 @@
             <a:pPr lvl="1"/>
             <a:r>
               <a:rPr lang="en-US" sz="2000" dirty="0" smtClean="0"/>
-              <a:t>String a = “Times Internet”; </a:t>
-            </a:r>
-            <a:r>
-              <a:rPr lang="en-US" sz="2000" dirty="0" smtClean="0"/>
-              <a:t>String b = “Times Internet Inc.”</a:t>
+              <a:t>String a = “Times Internet”; String b = “Times Internet Inc.”</a:t>
             </a:r>
           </a:p>
           <a:p>
@@ -8198,7 +8472,6 @@
               <a:rPr lang="en-US" sz="2000" dirty="0" smtClean="0"/>
               <a:t>Length of longest common subsequence is: 14</a:t>
             </a:r>
-            <a:endParaRPr lang="en-US" sz="2000" dirty="0" smtClean="0"/>
           </a:p>
           <a:p>
             <a:r>
@@ -8250,7 +8523,6 @@
               <a:rPr lang="en-US" sz="2000" dirty="0" smtClean="0"/>
               <a:t>Cosine similarity between vectors [only the dimensions where either of them exists are considered]</a:t>
             </a:r>
-            <a:endParaRPr lang="en-US" sz="2000" dirty="0" smtClean="0"/>
           </a:p>
         </p:txBody>
       </p:sp>
@@ -8339,7 +8611,7 @@
             </a:pPr>
             <a:fld id="{D6BE58A1-A4A9-468D-9971-E4F582D1F085}" type="datetime5">
               <a:rPr lang="en-US" smtClean="0"/>
-              <a:t>13-Nov-16</a:t>
+              <a:t>14-Nov-16</a:t>
             </a:fld>
             <a:endParaRPr lang="en-US"/>
           </a:p>
@@ -9042,7 +9314,7 @@
             </a:pPr>
             <a:fld id="{D6BE58A1-A4A9-468D-9971-E4F582D1F085}" type="datetime5">
               <a:rPr lang="en-US" smtClean="0"/>
-              <a:t>13-Nov-16</a:t>
+              <a:t>14-Nov-16</a:t>
             </a:fld>
             <a:endParaRPr lang="en-US"/>
           </a:p>
@@ -9161,11 +9433,7 @@
             <a:pPr lvl="1"/>
             <a:r>
               <a:rPr lang="en-US" dirty="0" smtClean="0"/>
-              <a:t>c</a:t>
-            </a:r>
-            <a:r>
-              <a:rPr lang="en-US" dirty="0" smtClean="0"/>
-              <a:t>luster_distribution.csv</a:t>
+              <a:t>cluster_distribution.csv</a:t>
             </a:r>
           </a:p>
           <a:p>
@@ -9334,7 +9602,7 @@
             </a:pPr>
             <a:fld id="{D6BE58A1-A4A9-468D-9971-E4F582D1F085}" type="datetime5">
               <a:rPr lang="en-US" smtClean="0"/>
-              <a:t>13-Nov-16</a:t>
+              <a:t>14-Nov-16</a:t>
             </a:fld>
             <a:endParaRPr lang="en-US"/>
           </a:p>
@@ -9570,7 +9838,7 @@
             </a:pPr>
             <a:fld id="{D6BE58A1-A4A9-468D-9971-E4F582D1F085}" type="datetime5">
               <a:rPr lang="en-US" smtClean="0"/>
-              <a:t>13-Nov-16</a:t>
+              <a:t>14-Nov-16</a:t>
             </a:fld>
             <a:endParaRPr lang="en-US"/>
           </a:p>
@@ -9836,7 +10104,7 @@
             </a:pPr>
             <a:fld id="{D6BE58A1-A4A9-468D-9971-E4F582D1F085}" type="datetime5">
               <a:rPr lang="en-US" smtClean="0"/>
-              <a:t>13-Nov-16</a:t>
+              <a:t>14-Nov-16</a:t>
             </a:fld>
             <a:endParaRPr lang="en-US"/>
           </a:p>

</xml_diff>

<commit_message>
Added Future Works : Other Models
</commit_message>
<xml_diff>
--- a/presentation.pptx
+++ b/presentation.pptx
@@ -5,7 +5,7 @@
     <p:sldMasterId id="2147483648" r:id="rId1"/>
   </p:sldMasterIdLst>
   <p:notesMasterIdLst>
-    <p:notesMasterId r:id="rId16"/>
+    <p:notesMasterId r:id="rId17"/>
   </p:notesMasterIdLst>
   <p:sldIdLst>
     <p:sldId id="256" r:id="rId2"/>
@@ -17,11 +17,12 @@
     <p:sldId id="265" r:id="rId8"/>
     <p:sldId id="266" r:id="rId9"/>
     <p:sldId id="272" r:id="rId10"/>
-    <p:sldId id="267" r:id="rId11"/>
+    <p:sldId id="275" r:id="rId11"/>
     <p:sldId id="274" r:id="rId12"/>
     <p:sldId id="271" r:id="rId13"/>
-    <p:sldId id="268" r:id="rId14"/>
-    <p:sldId id="269" r:id="rId15"/>
+    <p:sldId id="267" r:id="rId14"/>
+    <p:sldId id="268" r:id="rId15"/>
+    <p:sldId id="269" r:id="rId16"/>
   </p:sldIdLst>
   <p:sldSz cx="9144000" cy="6858000" type="screen4x3"/>
   <p:notesSz cx="6858000" cy="9144000"/>
@@ -278,7 +279,7 @@
               <a:pPr>
                 <a:defRPr/>
               </a:pPr>
-              <a:t>11/15/2016</a:t>
+              <a:t>12/3/2016</a:t>
             </a:fld>
             <a:endParaRPr lang="en-US"/>
           </a:p>
@@ -1092,6 +1093,148 @@
           <a:p>
             <a:r>
               <a:rPr lang="en-US" dirty="0" smtClean="0"/>
+              <a:t>https://www.ads2book.com/ads2book/composeAd.html#</a:t>
+            </a:r>
+          </a:p>
+          <a:p>
+            <a:r>
+              <a:rPr lang="en-US" dirty="0" smtClean="0"/>
+              <a:t>Recruitment</a:t>
+            </a:r>
+          </a:p>
+          <a:p>
+            <a:r>
+              <a:rPr lang="en-US" dirty="0" smtClean="0"/>
+              <a:t>Consultancy</a:t>
+            </a:r>
+          </a:p>
+          <a:p>
+            <a:r>
+              <a:rPr lang="en-US" dirty="0" smtClean="0"/>
+              <a:t>I have </a:t>
+            </a:r>
+            <a:r>
+              <a:rPr lang="en-US" dirty="0" err="1" smtClean="0"/>
+              <a:t>ipening</a:t>
+            </a:r>
+            <a:r>
+              <a:rPr lang="en-US" dirty="0" smtClean="0"/>
+              <a:t> for Data </a:t>
+            </a:r>
+            <a:r>
+              <a:rPr lang="en-US" dirty="0" err="1" smtClean="0"/>
+              <a:t>Sience</a:t>
+            </a:r>
+            <a:r>
+              <a:rPr lang="en-US" dirty="0" smtClean="0"/>
+              <a:t> </a:t>
+            </a:r>
+            <a:r>
+              <a:rPr lang="en-US" dirty="0" err="1" smtClean="0"/>
+              <a:t>zConsultants</a:t>
+            </a:r>
+            <a:r>
+              <a:rPr lang="en-US" dirty="0" smtClean="0"/>
+              <a:t> with 3 years experience. R, Python, SQL, Hadoop/Spark Chit Funds</a:t>
+            </a:r>
+          </a:p>
+          <a:p>
+            <a:r>
+              <a:rPr lang="en-US" dirty="0" smtClean="0"/>
+              <a:t>Let Truth Prevail</a:t>
+            </a:r>
+            <a:endParaRPr lang="en-US" dirty="0"/>
+          </a:p>
+        </p:txBody>
+      </p:sp>
+      <p:sp>
+        <p:nvSpPr>
+          <p:cNvPr id="4" name="Slide Number Placeholder 3"/>
+          <p:cNvSpPr>
+            <a:spLocks noGrp="1"/>
+          </p:cNvSpPr>
+          <p:nvPr>
+            <p:ph type="sldNum" sz="quarter" idx="10"/>
+          </p:nvPr>
+        </p:nvSpPr>
+        <p:spPr/>
+        <p:txBody>
+          <a:bodyPr/>
+          <a:lstStyle/>
+          <a:p>
+            <a:pPr>
+              <a:defRPr/>
+            </a:pPr>
+            <a:fld id="{37FC56A9-71FA-49A8-A49B-73E0C4B6E024}" type="slidenum">
+              <a:rPr lang="en-US" smtClean="0"/>
+              <a:pPr>
+                <a:defRPr/>
+              </a:pPr>
+              <a:t>11</a:t>
+            </a:fld>
+            <a:endParaRPr lang="en-US"/>
+          </a:p>
+        </p:txBody>
+      </p:sp>
+    </p:spTree>
+    <p:extLst>
+      <p:ext uri="{BB962C8B-B14F-4D97-AF65-F5344CB8AC3E}">
+        <p14:creationId xmlns:p14="http://schemas.microsoft.com/office/powerpoint/2010/main" val="2682040660"/>
+      </p:ext>
+    </p:extLst>
+  </p:cSld>
+  <p:clrMapOvr>
+    <a:masterClrMapping/>
+  </p:clrMapOvr>
+</p:notes>
+</file>
+
+<file path=ppt/notesSlides/notesSlide6.xml><?xml version="1.0" encoding="utf-8"?>
+<p:notes xmlns:a="http://schemas.openxmlformats.org/drawingml/2006/main" xmlns:r="http://schemas.openxmlformats.org/officeDocument/2006/relationships" xmlns:p="http://schemas.openxmlformats.org/presentationml/2006/main">
+  <p:cSld>
+    <p:spTree>
+      <p:nvGrpSpPr>
+        <p:cNvPr id="1" name=""/>
+        <p:cNvGrpSpPr/>
+        <p:nvPr/>
+      </p:nvGrpSpPr>
+      <p:grpSpPr>
+        <a:xfrm>
+          <a:off x="0" y="0"/>
+          <a:ext cx="0" cy="0"/>
+          <a:chOff x="0" y="0"/>
+          <a:chExt cx="0" cy="0"/>
+        </a:xfrm>
+      </p:grpSpPr>
+      <p:sp>
+        <p:nvSpPr>
+          <p:cNvPr id="2" name="Slide Image Placeholder 1"/>
+          <p:cNvSpPr>
+            <a:spLocks noGrp="1" noRot="1" noChangeAspect="1"/>
+          </p:cNvSpPr>
+          <p:nvPr>
+            <p:ph type="sldImg"/>
+          </p:nvPr>
+        </p:nvSpPr>
+        <p:spPr/>
+      </p:sp>
+      <p:sp>
+        <p:nvSpPr>
+          <p:cNvPr id="3" name="Notes Placeholder 2"/>
+          <p:cNvSpPr>
+            <a:spLocks noGrp="1"/>
+          </p:cNvSpPr>
+          <p:nvPr>
+            <p:ph type="body" idx="1"/>
+          </p:nvPr>
+        </p:nvSpPr>
+        <p:spPr/>
+        <p:txBody>
+          <a:bodyPr/>
+          <a:lstStyle/>
+          <a:p>
+            <a:r>
+              <a:rPr lang="en-US" dirty="0" smtClean="0"/>
               <a:t>May be discussed if people are interested</a:t>
             </a:r>
             <a:endParaRPr lang="en-US" dirty="0"/>
@@ -1564,7 +1707,7 @@
             </a:pPr>
             <a:fld id="{B95CCD0E-0695-40D8-9A46-F693866F34C0}" type="datetime5">
               <a:rPr lang="en-US" smtClean="0"/>
-              <a:t>15-Nov-16</a:t>
+              <a:t>3-Dec-16</a:t>
             </a:fld>
             <a:endParaRPr lang="en-US"/>
           </a:p>
@@ -1775,7 +1918,7 @@
             </a:pPr>
             <a:fld id="{9CA67BDA-2B39-4562-8FEF-26CB1D5EC69C}" type="datetime5">
               <a:rPr lang="en-US" smtClean="0"/>
-              <a:t>15-Nov-16</a:t>
+              <a:t>3-Dec-16</a:t>
             </a:fld>
             <a:endParaRPr lang="en-US"/>
           </a:p>
@@ -1977,7 +2120,7 @@
             </a:pPr>
             <a:fld id="{90402F7C-E1B4-4EEF-8EAC-2DC6FF75E124}" type="datetime5">
               <a:rPr lang="en-US" smtClean="0"/>
-              <a:t>15-Nov-16</a:t>
+              <a:t>3-Dec-16</a:t>
             </a:fld>
             <a:endParaRPr lang="en-US"/>
           </a:p>
@@ -2441,7 +2584,7 @@
             </a:pPr>
             <a:fld id="{8D8EC1B1-678F-4353-B339-B32CD0B6B2EE}" type="datetime5">
               <a:rPr lang="en-US" smtClean="0"/>
-              <a:t>15-Nov-16</a:t>
+              <a:t>3-Dec-16</a:t>
             </a:fld>
             <a:endParaRPr lang="en-US"/>
           </a:p>
@@ -2728,7 +2871,7 @@
             </a:pPr>
             <a:fld id="{0A6314FE-947B-4C62-AFD9-865701E0787A}" type="datetime5">
               <a:rPr lang="en-US" smtClean="0"/>
-              <a:t>15-Nov-16</a:t>
+              <a:t>3-Dec-16</a:t>
             </a:fld>
             <a:endParaRPr lang="en-US"/>
           </a:p>
@@ -3308,7 +3451,7 @@
             </a:pPr>
             <a:fld id="{D93FB54F-99C1-4EAE-96D1-205A70D33FA0}" type="datetime5">
               <a:rPr lang="en-US" smtClean="0"/>
-              <a:t>15-Nov-16</a:t>
+              <a:t>3-Dec-16</a:t>
             </a:fld>
             <a:endParaRPr lang="en-US"/>
           </a:p>
@@ -4036,7 +4179,7 @@
             </a:pPr>
             <a:fld id="{2B70D84A-2810-4E03-B637-D1C23EA2DC0E}" type="datetime5">
               <a:rPr lang="en-US" smtClean="0"/>
-              <a:t>15-Nov-16</a:t>
+              <a:t>3-Dec-16</a:t>
             </a:fld>
             <a:endParaRPr lang="en-US"/>
           </a:p>
@@ -4472,7 +4615,7 @@
             </a:pPr>
             <a:fld id="{A02FB751-A013-40AD-8468-76A1C0A073BF}" type="datetime5">
               <a:rPr lang="en-US" smtClean="0"/>
-              <a:t>15-Nov-16</a:t>
+              <a:t>3-Dec-16</a:t>
             </a:fld>
             <a:endParaRPr lang="en-US"/>
           </a:p>
@@ -4802,7 +4945,7 @@
             </a:pPr>
             <a:fld id="{74C79B44-033C-4863-B3C5-CADF4B60E8D8}" type="datetime5">
               <a:rPr lang="en-US" smtClean="0"/>
-              <a:t>15-Nov-16</a:t>
+              <a:t>3-Dec-16</a:t>
             </a:fld>
             <a:endParaRPr lang="en-US"/>
           </a:p>
@@ -5119,7 +5262,7 @@
             </a:pPr>
             <a:fld id="{1C6C9EC6-6038-4D3A-BEE7-6F3B0EC2A9E8}" type="datetime5">
               <a:rPr lang="en-US" smtClean="0"/>
-              <a:t>15-Nov-16</a:t>
+              <a:t>3-Dec-16</a:t>
             </a:fld>
             <a:endParaRPr lang="en-US"/>
           </a:p>
@@ -5401,7 +5544,7 @@
             </a:pPr>
             <a:fld id="{4B89CB4A-2697-433E-BF41-B14E4BD2B40C}" type="datetime5">
               <a:rPr lang="en-US" smtClean="0"/>
-              <a:t>15-Nov-16</a:t>
+              <a:t>3-Dec-16</a:t>
             </a:fld>
             <a:endParaRPr lang="en-US"/>
           </a:p>
@@ -5657,7 +5800,7 @@
             </a:pPr>
             <a:fld id="{D42D1055-E9A1-4521-AC5F-D38EF75C250B}" type="datetime5">
               <a:rPr lang="en-US" smtClean="0"/>
-              <a:t>15-Nov-16</a:t>
+              <a:t>3-Dec-16</a:t>
             </a:fld>
             <a:endParaRPr lang="en-US"/>
           </a:p>
@@ -6197,7 +6340,7 @@
         </p:nvSpPr>
         <p:spPr>
           <a:xfrm>
-            <a:off x="609600" y="1600200"/>
+            <a:off x="609600" y="1828800"/>
             <a:ext cx="7772400" cy="838200"/>
           </a:xfrm>
         </p:spPr>
@@ -6207,35 +6350,23 @@
           <a:p>
             <a:r>
               <a:rPr lang="en-US" dirty="0" smtClean="0"/>
-              <a:t>Clustering of names of companies</a:t>
-            </a:r>
-            <a:endParaRPr lang="en-US" dirty="0"/>
-          </a:p>
-        </p:txBody>
-      </p:sp>
-      <p:sp>
-        <p:nvSpPr>
-          <p:cNvPr id="3" name="Subtitle 2"/>
-          <p:cNvSpPr>
-            <a:spLocks noGrp="1"/>
-          </p:cNvSpPr>
-          <p:nvPr>
-            <p:ph type="subTitle" idx="1"/>
-          </p:nvPr>
-        </p:nvSpPr>
-        <p:spPr>
-          <a:xfrm>
-            <a:off x="1219200" y="2667000"/>
-            <a:ext cx="6400800" cy="533400"/>
-          </a:xfrm>
-        </p:spPr>
-        <p:txBody>
-          <a:bodyPr/>
-          <a:lstStyle/>
-          <a:p>
+              <a:t>Using Entity </a:t>
+            </a:r>
             <a:r>
               <a:rPr lang="en-US" dirty="0" smtClean="0"/>
-              <a:t>Using Text Analytics</a:t>
+              <a:t>Resolution </a:t>
+            </a:r>
+            <a:r>
+              <a:rPr lang="en-US" dirty="0" smtClean="0"/>
+              <a:t>to cluster </a:t>
+            </a:r>
+            <a:r>
+              <a:rPr lang="en-US" dirty="0" smtClean="0"/>
+              <a:t>names of </a:t>
+            </a:r>
+            <a:r>
+              <a:rPr lang="en-US" dirty="0" smtClean="0"/>
+              <a:t>organizations</a:t>
             </a:r>
             <a:endParaRPr lang="en-US" dirty="0"/>
           </a:p>
@@ -6303,7 +6434,7 @@
             </a:pPr>
             <a:fld id="{8E517C41-1FF7-4556-93EB-1042E97E7846}" type="datetime5">
               <a:rPr lang="en-US" smtClean="0"/>
-              <a:t>15-Nov-16</a:t>
+              <a:t>3-Dec-16</a:t>
             </a:fld>
             <a:endParaRPr lang="en-US"/>
           </a:p>
@@ -6380,94 +6511,129 @@
             <p:ph idx="1"/>
           </p:nvPr>
         </p:nvSpPr>
+        <p:spPr>
+          <a:xfrm>
+            <a:off x="304800" y="1143000"/>
+            <a:ext cx="8382000" cy="5059363"/>
+          </a:xfrm>
+        </p:spPr>
+        <p:txBody>
+          <a:bodyPr/>
+          <a:lstStyle/>
+          <a:p>
+            <a:pPr marL="457200" lvl="1" indent="0">
+              <a:buNone/>
+            </a:pPr>
+            <a:endParaRPr lang="en-US" sz="1600" dirty="0" smtClean="0"/>
+          </a:p>
+          <a:p>
+            <a:r>
+              <a:rPr lang="en-US" sz="2000" b="1" dirty="0" smtClean="0"/>
+              <a:t>Deep Learning based approach</a:t>
+            </a:r>
+          </a:p>
+          <a:p>
+            <a:pPr lvl="1"/>
+            <a:r>
+              <a:rPr lang="en-US" sz="1600" dirty="0" smtClean="0"/>
+              <a:t>Training Deep Neural Network after extraction of features (Connected Entities, Relations, Entity Types, Entity Description) [Ref: 7]</a:t>
+            </a:r>
+          </a:p>
+          <a:p>
+            <a:pPr marL="457200" lvl="1" indent="0">
+              <a:buNone/>
+            </a:pPr>
+            <a:endParaRPr lang="en-US" sz="1600" dirty="0" smtClean="0"/>
+          </a:p>
+          <a:p>
+            <a:r>
+              <a:rPr lang="en-US" sz="2000" b="1" dirty="0"/>
+              <a:t>Markov Logic based</a:t>
+            </a:r>
+          </a:p>
+          <a:p>
+            <a:pPr lvl="1"/>
+            <a:r>
+              <a:rPr lang="en-US" sz="1600" dirty="0"/>
+              <a:t>Combination of First Order Logic &amp; Markov </a:t>
+            </a:r>
+            <a:r>
+              <a:rPr lang="en-US" sz="1600" dirty="0" smtClean="0"/>
+              <a:t>Networks [Ref: 8]</a:t>
+            </a:r>
+            <a:endParaRPr lang="en-US" sz="1600" dirty="0"/>
+          </a:p>
+          <a:p>
+            <a:endParaRPr lang="en-US" sz="2000" dirty="0" smtClean="0"/>
+          </a:p>
+          <a:p>
+            <a:r>
+              <a:rPr lang="en-US" sz="2000" b="1" dirty="0" smtClean="0"/>
+              <a:t>Graph </a:t>
+            </a:r>
+            <a:r>
+              <a:rPr lang="en-US" sz="2000" b="1" dirty="0" smtClean="0"/>
+              <a:t>based approaches using Map </a:t>
+            </a:r>
+            <a:r>
+              <a:rPr lang="en-US" sz="2000" b="1" dirty="0" smtClean="0"/>
+              <a:t>Reduce</a:t>
+            </a:r>
+          </a:p>
+          <a:p>
+            <a:pPr lvl="1"/>
+            <a:r>
+              <a:rPr lang="en-US" sz="1600" dirty="0" smtClean="0"/>
+              <a:t>Blocking -&gt; Linking -&gt; Clustering [Ref: 6]</a:t>
+            </a:r>
+            <a:endParaRPr lang="en-US" sz="1600" dirty="0" smtClean="0"/>
+          </a:p>
+          <a:p>
+            <a:endParaRPr lang="en-US" sz="2000" dirty="0" smtClean="0"/>
+          </a:p>
+          <a:p>
+            <a:r>
+              <a:rPr lang="en-US" sz="2000" dirty="0" smtClean="0"/>
+              <a:t>And </a:t>
+            </a:r>
+            <a:r>
+              <a:rPr lang="en-US" sz="2000" dirty="0" smtClean="0"/>
+              <a:t>many </a:t>
+            </a:r>
+            <a:r>
+              <a:rPr lang="en-US" sz="2000" dirty="0" smtClean="0"/>
+              <a:t>others</a:t>
+            </a:r>
+            <a:r>
+              <a:rPr lang="en-US" sz="2000" dirty="0"/>
+              <a:t> </a:t>
+            </a:r>
+            <a:r>
+              <a:rPr lang="en-US" sz="2000" dirty="0" smtClean="0"/>
+              <a:t>….</a:t>
+            </a:r>
+            <a:endParaRPr lang="en-US" sz="2000" dirty="0" smtClean="0"/>
+          </a:p>
+        </p:txBody>
+      </p:sp>
+      <p:sp>
+        <p:nvSpPr>
+          <p:cNvPr id="3" name="Title 2"/>
+          <p:cNvSpPr>
+            <a:spLocks noGrp="1"/>
+          </p:cNvSpPr>
+          <p:nvPr>
+            <p:ph type="title"/>
+          </p:nvPr>
+        </p:nvSpPr>
         <p:spPr/>
         <p:txBody>
           <a:bodyPr/>
           <a:lstStyle/>
           <a:p>
-            <a:pPr marL="0" indent="0">
-              <a:buNone/>
-            </a:pPr>
-            <a:endParaRPr lang="en-US" sz="2000" dirty="0"/>
-          </a:p>
-          <a:p>
-            <a:r>
-              <a:rPr lang="en-US" sz="2000" dirty="0" smtClean="0"/>
-              <a:t>http</a:t>
-            </a:r>
-            <a:r>
-              <a:rPr lang="en-US" sz="2000" dirty="0"/>
-              <a:t>://www.cs.umd.edu/~getoor/Tutorials/ER_VLDB2012.pdf</a:t>
-            </a:r>
-          </a:p>
-          <a:p>
-            <a:r>
-              <a:rPr lang="en-US" sz="2000" dirty="0" smtClean="0"/>
-              <a:t>http</a:t>
-            </a:r>
-            <a:r>
-              <a:rPr lang="en-US" sz="2000" dirty="0"/>
-              <a:t>://precog.iiitd.edu.in/Publications_files/Paridhi_Jain_Comprehensive_Report_Spring_2013.pdf</a:t>
-            </a:r>
-          </a:p>
-          <a:p>
-            <a:r>
-              <a:rPr lang="en-US" sz="2000" dirty="0" smtClean="0"/>
-              <a:t>http</a:t>
-            </a:r>
-            <a:r>
-              <a:rPr lang="en-US" sz="2000" dirty="0"/>
-              <a:t>://vldb.org/pvldb/vol5/p2018_lisegetoor_vldb2012.pdf </a:t>
-            </a:r>
-          </a:p>
-          <a:p>
-            <a:r>
-              <a:rPr lang="en-US" sz="2000" dirty="0" smtClean="0"/>
-              <a:t>https</a:t>
-            </a:r>
-            <a:r>
-              <a:rPr lang="en-US" sz="2000" dirty="0"/>
-              <a:t>://</a:t>
-            </a:r>
-            <a:r>
-              <a:rPr lang="en-US" sz="2000" dirty="0" smtClean="0"/>
-              <a:t>cran.r-project.org/web/packages/qualV/index.html</a:t>
-            </a:r>
-            <a:endParaRPr lang="en-US" sz="2000" dirty="0"/>
-          </a:p>
-          <a:p>
-            <a:r>
-              <a:rPr lang="en-US" sz="2000" dirty="0" smtClean="0"/>
-              <a:t>https</a:t>
-            </a:r>
-            <a:r>
-              <a:rPr lang="en-US" sz="2000" dirty="0"/>
-              <a:t>://cran.r-project.org/web/packages/stringdist/stringdist.pdf</a:t>
-            </a:r>
-          </a:p>
-          <a:p>
-            <a:endParaRPr lang="en-US" sz="2000" dirty="0"/>
-          </a:p>
-        </p:txBody>
-      </p:sp>
-      <p:sp>
-        <p:nvSpPr>
-          <p:cNvPr id="3" name="Title 2"/>
-          <p:cNvSpPr>
-            <a:spLocks noGrp="1"/>
-          </p:cNvSpPr>
-          <p:nvPr>
-            <p:ph type="title"/>
-          </p:nvPr>
-        </p:nvSpPr>
-        <p:spPr/>
-        <p:txBody>
-          <a:bodyPr/>
-          <a:lstStyle/>
-          <a:p>
             <a:r>
               <a:rPr lang="en-US" dirty="0" smtClean="0"/>
-              <a:t>References</a:t>
+              <a:t>Future Work : Other Models</a:t>
             </a:r>
             <a:endParaRPr lang="en-US" dirty="0"/>
           </a:p>
@@ -6535,7 +6701,7 @@
             </a:pPr>
             <a:fld id="{D6BE58A1-A4A9-468D-9971-E4F582D1F085}" type="datetime5">
               <a:rPr lang="en-US" smtClean="0"/>
-              <a:t>15-Nov-16</a:t>
+              <a:t>3-Dec-16</a:t>
             </a:fld>
             <a:endParaRPr lang="en-US"/>
           </a:p>
@@ -6573,7 +6739,7 @@
     </p:spTree>
     <p:extLst>
       <p:ext uri="{BB962C8B-B14F-4D97-AF65-F5344CB8AC3E}">
-        <p14:creationId xmlns:p14="http://schemas.microsoft.com/office/powerpoint/2010/main" val="281445289"/>
+        <p14:creationId xmlns:p14="http://schemas.microsoft.com/office/powerpoint/2010/main" val="589609307"/>
       </p:ext>
     </p:extLst>
   </p:cSld>
@@ -6630,56 +6796,174 @@
           <a:p>
             <a:r>
               <a:rPr lang="en-US" sz="2000" b="1" dirty="0" smtClean="0"/>
-              <a:t>Content summarizer</a:t>
+              <a:t>Word Recommendation, Dynamic Analysis </a:t>
             </a:r>
             <a:r>
               <a:rPr lang="en-US" sz="2000" dirty="0" smtClean="0"/>
-              <a:t> (120 words) for news articles published in ET, TOI </a:t>
+              <a:t>of content of Ads </a:t>
+            </a:r>
+            <a:r>
+              <a:rPr lang="en-US" sz="2000" dirty="0"/>
+              <a:t>being drafted at </a:t>
+            </a:r>
+            <a:r>
+              <a:rPr lang="en-US" sz="2000" dirty="0" smtClean="0"/>
+              <a:t>ads2book</a:t>
+            </a:r>
+          </a:p>
+          <a:p>
+            <a:endParaRPr lang="en-US" sz="2000" b="1" dirty="0" smtClean="0"/>
+          </a:p>
+          <a:p>
+            <a:r>
+              <a:rPr lang="en-US" sz="2000" b="1" dirty="0" smtClean="0"/>
+              <a:t>Content </a:t>
+            </a:r>
+            <a:r>
+              <a:rPr lang="en-US" sz="2000" b="1" dirty="0" smtClean="0"/>
+              <a:t>summarizer</a:t>
+            </a:r>
+            <a:r>
+              <a:rPr lang="en-US" sz="2000" dirty="0" smtClean="0"/>
+              <a:t> (120 words) for news </a:t>
+            </a:r>
+            <a:r>
+              <a:rPr lang="en-US" sz="2000" dirty="0" smtClean="0"/>
+              <a:t>articles, user reviews on jobs, interview questions etc.</a:t>
             </a:r>
             <a:endParaRPr lang="en-US" sz="2000" dirty="0"/>
           </a:p>
           <a:p>
+            <a:endParaRPr lang="en-US" sz="2000" dirty="0" smtClean="0"/>
+          </a:p>
+          <a:p>
+            <a:r>
+              <a:rPr lang="en-US" sz="2000" dirty="0" smtClean="0"/>
+              <a:t>More</a:t>
+            </a:r>
             <a:r>
               <a:rPr lang="en-US" sz="2000" b="1" dirty="0" smtClean="0"/>
-              <a:t>Personalized news feeds</a:t>
-            </a:r>
-          </a:p>
-          <a:p>
+              <a:t> </a:t>
+            </a:r>
+            <a:r>
+              <a:rPr lang="en-US" sz="2000" b="1" dirty="0" smtClean="0"/>
+              <a:t>personalized </a:t>
+            </a:r>
+            <a:r>
+              <a:rPr lang="en-US" sz="2000" b="1" dirty="0" smtClean="0"/>
+              <a:t>news </a:t>
+            </a:r>
+            <a:r>
+              <a:rPr lang="en-US" sz="2000" b="1" dirty="0" smtClean="0"/>
+              <a:t>feeds, jobs </a:t>
+            </a:r>
             <a:r>
               <a:rPr lang="en-US" sz="2000" dirty="0" smtClean="0"/>
-              <a:t>Text to Voice (</a:t>
-            </a:r>
+              <a:t>by integrating Social Media Data</a:t>
+            </a:r>
+            <a:endParaRPr lang="en-US" sz="2000" b="1" dirty="0" smtClean="0"/>
+          </a:p>
+          <a:p>
+            <a:endParaRPr lang="en-US" sz="2000" b="1" dirty="0" smtClean="0"/>
+          </a:p>
+          <a:p>
             <a:r>
               <a:rPr lang="en-US" sz="2000" b="1" dirty="0" smtClean="0"/>
-              <a:t>News Reader</a:t>
+              <a:t>Sentiment </a:t>
+            </a:r>
+            <a:r>
+              <a:rPr lang="en-US" sz="2000" b="1" dirty="0" smtClean="0"/>
+              <a:t>Analysis </a:t>
             </a:r>
             <a:r>
               <a:rPr lang="en-US" sz="2000" dirty="0" smtClean="0"/>
-              <a:t>) [May be in future!]</a:t>
-            </a:r>
-          </a:p>
-          <a:p>
-            <a:r>
-              <a:rPr lang="en-US" sz="2000" b="1" dirty="0" smtClean="0"/>
-              <a:t>Sentiment Analysis </a:t>
+              <a:t>of users’ </a:t>
             </a:r>
             <a:r>
               <a:rPr lang="en-US" sz="2000" dirty="0" smtClean="0"/>
-              <a:t>of users’ comments about news articles, movies etc.</a:t>
-            </a:r>
-          </a:p>
-          <a:p>
+              <a:t>reviews </a:t>
+            </a:r>
             <a:r>
               <a:rPr lang="en-US" sz="2000" dirty="0" smtClean="0"/>
-              <a:t>And much more!!! </a:t>
-            </a:r>
-            <a:r>
-              <a:rPr lang="en-US" sz="2000" b="1" dirty="0" smtClean="0">
+              <a:t>about </a:t>
+            </a:r>
+            <a:r>
+              <a:rPr lang="en-US" sz="2000" dirty="0" smtClean="0"/>
+              <a:t>jobs, news, </a:t>
+            </a:r>
+            <a:r>
+              <a:rPr lang="en-US" sz="2000" dirty="0" smtClean="0"/>
+              <a:t>movies etc.</a:t>
+            </a:r>
+          </a:p>
+          <a:p>
+            <a:endParaRPr lang="en-US" sz="2000" dirty="0" smtClean="0"/>
+          </a:p>
+          <a:p>
+            <a:r>
+              <a:rPr lang="en-US" sz="2000" dirty="0" smtClean="0"/>
+              <a:t>And </a:t>
+            </a:r>
+            <a:r>
+              <a:rPr lang="en-US" sz="2000" dirty="0" smtClean="0"/>
+              <a:t>much </a:t>
+            </a:r>
+            <a:r>
+              <a:rPr lang="en-US" sz="2000" dirty="0" smtClean="0"/>
+              <a:t>more to “</a:t>
+            </a:r>
+            <a:r>
+              <a:rPr lang="en-US" sz="2000" i="1" dirty="0" smtClean="0"/>
+              <a:t>Simplify Life”</a:t>
+            </a:r>
+            <a:r>
+              <a:rPr lang="en-US" sz="2000" dirty="0" smtClean="0"/>
+              <a:t> !!! </a:t>
+            </a:r>
+          </a:p>
+          <a:p>
+            <a:endParaRPr lang="en-US" sz="2000" b="1" dirty="0">
+              <a:sym typeface="Wingdings" panose="05000000000000000000" pitchFamily="2" charset="2"/>
+            </a:endParaRPr>
+          </a:p>
+          <a:p>
+            <a:pPr marL="0" indent="0">
+              <a:buNone/>
+            </a:pPr>
+            <a:r>
+              <a:rPr lang="en-US" sz="2000" i="1" dirty="0" smtClean="0">
+                <a:latin typeface="MV Boli" panose="02000500030200090000" pitchFamily="2" charset="0"/>
+                <a:cs typeface="MV Boli" panose="02000500030200090000" pitchFamily="2" charset="0"/>
+                <a:sym typeface="Wingdings" panose="05000000000000000000" pitchFamily="2" charset="2"/>
+              </a:rPr>
+              <a:t>	What I</a:t>
+            </a:r>
+            <a:r>
+              <a:rPr lang="en-US" sz="2000" b="1" i="1" dirty="0" smtClean="0">
+                <a:latin typeface="MV Boli" panose="02000500030200090000" pitchFamily="2" charset="0"/>
+                <a:cs typeface="MV Boli" panose="02000500030200090000" pitchFamily="2" charset="0"/>
+                <a:sym typeface="Wingdings" panose="05000000000000000000" pitchFamily="2" charset="2"/>
+              </a:rPr>
+              <a:t> NEED? -&gt; GUIDANCE &amp; SUPPORT  </a:t>
+            </a:r>
+            <a:r>
+              <a:rPr lang="en-US" sz="2000" b="1" i="1" dirty="0" smtClean="0">
                 <a:sym typeface="Wingdings" panose="05000000000000000000" pitchFamily="2" charset="2"/>
               </a:rPr>
               <a:t></a:t>
             </a:r>
-            <a:endParaRPr lang="en-US" sz="2000" b="1" dirty="0"/>
+            <a:endParaRPr lang="en-US" sz="2000" b="1" i="1" dirty="0">
+              <a:sym typeface="Wingdings" panose="05000000000000000000" pitchFamily="2" charset="2"/>
+            </a:endParaRPr>
+          </a:p>
+          <a:p>
+            <a:pPr marL="0" indent="0">
+              <a:buNone/>
+            </a:pPr>
+            <a:endParaRPr lang="en-US" sz="2000" b="1" i="1" dirty="0">
+              <a:latin typeface="MV Boli" panose="02000500030200090000" pitchFamily="2" charset="0"/>
+              <a:cs typeface="MV Boli" panose="02000500030200090000" pitchFamily="2" charset="0"/>
+            </a:endParaRPr>
           </a:p>
         </p:txBody>
       </p:sp>
@@ -6768,7 +7052,7 @@
             </a:pPr>
             <a:fld id="{D6BE58A1-A4A9-468D-9971-E4F582D1F085}" type="datetime5">
               <a:rPr lang="en-US" smtClean="0"/>
-              <a:t>15-Nov-16</a:t>
+              <a:t>3-Dec-16</a:t>
             </a:fld>
             <a:endParaRPr lang="en-US"/>
           </a:p>
@@ -6800,52 +7084,6 @@
               <a:t>11</a:t>
             </a:fld>
             <a:endParaRPr lang="en-US"/>
-          </a:p>
-        </p:txBody>
-      </p:sp>
-      <p:sp>
-        <p:nvSpPr>
-          <p:cNvPr id="4" name="TextBox 3"/>
-          <p:cNvSpPr txBox="1"/>
-          <p:nvPr/>
-        </p:nvSpPr>
-        <p:spPr>
-          <a:xfrm>
-            <a:off x="133289" y="6126163"/>
-            <a:ext cx="9202327" cy="338554"/>
-          </a:xfrm>
-          <a:prstGeom prst="rect">
-            <a:avLst/>
-          </a:prstGeom>
-          <a:noFill/>
-        </p:spPr>
-        <p:txBody>
-          <a:bodyPr wrap="none" rtlCol="0">
-            <a:spAutoFit/>
-          </a:bodyPr>
-          <a:lstStyle/>
-          <a:p>
-            <a:r>
-              <a:rPr lang="en-US" sz="1600" dirty="0" smtClean="0"/>
-              <a:t>NOTE: I am covering only these products because I am an avid user of them (TOI, ET, </a:t>
-            </a:r>
-            <a:r>
-              <a:rPr lang="en-US" sz="1600" dirty="0" err="1" smtClean="0"/>
-              <a:t>Ei</a:t>
-            </a:r>
-            <a:r>
-              <a:rPr lang="en-US" sz="1600" dirty="0" smtClean="0"/>
-              <a:t> </a:t>
-            </a:r>
-            <a:r>
-              <a:rPr lang="en-US" sz="1600" dirty="0" err="1" smtClean="0"/>
-              <a:t>Samay</a:t>
-            </a:r>
-            <a:r>
-              <a:rPr lang="en-US" sz="1600" dirty="0" smtClean="0"/>
-              <a:t>) ! </a:t>
-            </a:r>
-            <a:endParaRPr lang="en-US" sz="1600" dirty="0"/>
           </a:p>
         </p:txBody>
       </p:sp>
@@ -6928,11 +7166,7 @@
             </a:pPr>
             <a:r>
               <a:rPr lang="en-US" sz="1800" i="1" dirty="0" smtClean="0"/>
-              <a:t>[IJARCST</a:t>
-            </a:r>
-            <a:r>
-              <a:rPr lang="en-US" sz="1800" i="1" dirty="0" smtClean="0"/>
-              <a:t>, Vol 3, Issue 1, pp 41-46] (journal) </a:t>
+              <a:t>[IJARCST, Vol 3, Issue 1, pp 41-46] (journal) </a:t>
             </a:r>
           </a:p>
           <a:p>
@@ -6940,9 +7174,20 @@
               <a:buFont typeface="Wingdings" panose="05000000000000000000" pitchFamily="2" charset="2"/>
               <a:buChar char="Ø"/>
             </a:pPr>
+            <a:endParaRPr lang="en-US" sz="2000" b="1" dirty="0" smtClean="0"/>
+          </a:p>
+          <a:p>
+            <a:pPr>
+              <a:buFont typeface="Wingdings" panose="05000000000000000000" pitchFamily="2" charset="2"/>
+              <a:buChar char="Ø"/>
+            </a:pPr>
+            <a:r>
+              <a:rPr lang="en-US" sz="2000" b="1" dirty="0" smtClean="0"/>
+              <a:t>Recommendation </a:t>
+            </a:r>
             <a:r>
               <a:rPr lang="en-US" sz="2000" b="1" dirty="0"/>
-              <a:t>Recommendation System based on Product Purchase </a:t>
+              <a:t>System based on Product Purchase </a:t>
             </a:r>
             <a:r>
               <a:rPr lang="en-US" sz="2000" b="1" dirty="0" smtClean="0"/>
@@ -6993,9 +7238,20 @@
               <a:buFont typeface="Wingdings" panose="05000000000000000000" pitchFamily="2" charset="2"/>
               <a:buChar char="Ø"/>
             </a:pPr>
+            <a:endParaRPr lang="en-US" sz="2000" b="1" dirty="0" smtClean="0"/>
+          </a:p>
+          <a:p>
+            <a:pPr>
+              <a:buFont typeface="Wingdings" panose="05000000000000000000" pitchFamily="2" charset="2"/>
+              <a:buChar char="Ø"/>
+            </a:pPr>
+            <a:r>
+              <a:rPr lang="en-US" sz="2000" b="1" dirty="0" smtClean="0"/>
+              <a:t>Extraction </a:t>
+            </a:r>
             <a:r>
               <a:rPr lang="en-US" sz="2000" b="1" dirty="0"/>
-              <a:t>Extraction &amp; Analysis of Publication Data of Conferences </a:t>
+              <a:t>&amp; Analysis of Publication Data of Conferences </a:t>
             </a:r>
             <a:endParaRPr lang="en-US" sz="2000" b="1" dirty="0" smtClean="0"/>
           </a:p>
@@ -7030,9 +7286,20 @@
               <a:buFont typeface="Wingdings" panose="05000000000000000000" pitchFamily="2" charset="2"/>
               <a:buChar char="Ø"/>
             </a:pPr>
+            <a:endParaRPr lang="en-US" sz="2000" b="1" dirty="0" smtClean="0"/>
+          </a:p>
+          <a:p>
+            <a:pPr>
+              <a:buFont typeface="Wingdings" panose="05000000000000000000" pitchFamily="2" charset="2"/>
+              <a:buChar char="Ø"/>
+            </a:pPr>
+            <a:r>
+              <a:rPr lang="en-US" sz="2000" b="1" dirty="0" smtClean="0"/>
+              <a:t>Analysis </a:t>
+            </a:r>
             <a:r>
               <a:rPr lang="en-US" sz="2000" b="1" dirty="0"/>
-              <a:t>Analysis of Computer Science publications </a:t>
+              <a:t>of Computer Science publications </a:t>
             </a:r>
             <a:endParaRPr lang="en-US" sz="2000" b="1" dirty="0" smtClean="0"/>
           </a:p>
@@ -7110,12 +7377,6 @@
             <a:r>
               <a:rPr lang="en-US" dirty="0" smtClean="0"/>
               <a:t>My Relevant Experience </a:t>
-            </a:r>
-            <a:r>
-              <a:rPr lang="en-US" dirty="0" smtClean="0">
-                <a:sym typeface="Wingdings" panose="05000000000000000000" pitchFamily="2" charset="2"/>
-              </a:rPr>
-              <a:t></a:t>
             </a:r>
             <a:endParaRPr lang="en-US" dirty="0"/>
           </a:p>
@@ -7183,7 +7444,7 @@
             </a:pPr>
             <a:fld id="{D6BE58A1-A4A9-468D-9971-E4F582D1F085}" type="datetime5">
               <a:rPr lang="en-US" smtClean="0"/>
-              <a:t>15-Nov-16</a:t>
+              <a:t>3-Dec-16</a:t>
             </a:fld>
             <a:endParaRPr lang="en-US"/>
           </a:p>
@@ -7255,35 +7516,310 @@
           <a:chExt cx="0" cy="0"/>
         </a:xfrm>
       </p:grpSpPr>
-      <p:pic>
-        <p:nvPicPr>
-          <p:cNvPr id="4" name="Content Placeholder 3"/>
-          <p:cNvPicPr>
-            <a:picLocks noGrp="1" noChangeAspect="1"/>
-          </p:cNvPicPr>
+      <p:sp>
+        <p:nvSpPr>
+          <p:cNvPr id="2" name="Content Placeholder 1"/>
+          <p:cNvSpPr>
+            <a:spLocks noGrp="1"/>
+          </p:cNvSpPr>
           <p:nvPr>
             <p:ph idx="1"/>
           </p:nvPr>
-        </p:nvPicPr>
-        <p:blipFill>
-          <a:blip r:embed="rId2">
-            <a:extLst>
-              <a:ext uri="{28A0092B-C50C-407E-A947-70E740481C1C}">
-                <a14:useLocalDpi xmlns:a14="http://schemas.microsoft.com/office/drawing/2010/main" val="0"/>
-              </a:ext>
-            </a:extLst>
-          </a:blip>
-          <a:stretch>
-            <a:fillRect/>
-          </a:stretch>
-        </p:blipFill>
-        <p:spPr>
-          <a:xfrm>
-            <a:off x="2352675" y="1453356"/>
-            <a:ext cx="4286250" cy="4286250"/>
-          </a:xfrm>
-        </p:spPr>
-      </p:pic>
+        </p:nvSpPr>
+        <p:spPr/>
+        <p:txBody>
+          <a:bodyPr/>
+          <a:lstStyle/>
+          <a:p>
+            <a:pPr marL="457200" indent="-457200">
+              <a:buFont typeface="+mj-lt"/>
+              <a:buAutoNum type="arabicPeriod"/>
+            </a:pPr>
+            <a:endParaRPr lang="en-US" sz="2000" dirty="0"/>
+          </a:p>
+          <a:p>
+            <a:pPr marL="457200" indent="-457200">
+              <a:buFont typeface="+mj-lt"/>
+              <a:buAutoNum type="arabicPeriod"/>
+            </a:pPr>
+            <a:r>
+              <a:rPr lang="en-US" sz="2000" dirty="0" smtClean="0">
+                <a:hlinkClick r:id="rId2"/>
+              </a:rPr>
+              <a:t>http</a:t>
+            </a:r>
+            <a:r>
+              <a:rPr lang="en-US" sz="2000" dirty="0">
+                <a:hlinkClick r:id="rId2"/>
+              </a:rPr>
+              <a:t>://www.cs.umd.edu/~</a:t>
+            </a:r>
+            <a:r>
+              <a:rPr lang="en-US" sz="2000" dirty="0" smtClean="0">
+                <a:hlinkClick r:id="rId2"/>
+              </a:rPr>
+              <a:t>getoor/Tutorials/ER_VLDB2012.pdf</a:t>
+            </a:r>
+            <a:endParaRPr lang="en-US" sz="2000" dirty="0"/>
+          </a:p>
+          <a:p>
+            <a:pPr marL="457200" indent="-457200">
+              <a:buFont typeface="+mj-lt"/>
+              <a:buAutoNum type="arabicPeriod"/>
+            </a:pPr>
+            <a:r>
+              <a:rPr lang="en-US" sz="2000" dirty="0" smtClean="0">
+                <a:hlinkClick r:id="rId3"/>
+              </a:rPr>
+              <a:t>http</a:t>
+            </a:r>
+            <a:r>
+              <a:rPr lang="en-US" sz="2000" dirty="0">
+                <a:hlinkClick r:id="rId3"/>
+              </a:rPr>
+              <a:t>://</a:t>
+            </a:r>
+            <a:r>
+              <a:rPr lang="en-US" sz="2000" dirty="0" smtClean="0">
+                <a:hlinkClick r:id="rId3"/>
+              </a:rPr>
+              <a:t>precog.iiitd.edu.in/Publications_files/Paridhi_Jain_Comprehensive_Report_Spring_2013.pdf</a:t>
+            </a:r>
+            <a:endParaRPr lang="en-US" sz="2000" dirty="0"/>
+          </a:p>
+          <a:p>
+            <a:pPr marL="457200" indent="-457200">
+              <a:buFont typeface="+mj-lt"/>
+              <a:buAutoNum type="arabicPeriod"/>
+            </a:pPr>
+            <a:r>
+              <a:rPr lang="en-US" sz="2000" dirty="0" smtClean="0">
+                <a:hlinkClick r:id="rId4"/>
+              </a:rPr>
+              <a:t>http</a:t>
+            </a:r>
+            <a:r>
+              <a:rPr lang="en-US" sz="2000" dirty="0">
+                <a:hlinkClick r:id="rId4"/>
+              </a:rPr>
+              <a:t>://</a:t>
+            </a:r>
+            <a:r>
+              <a:rPr lang="en-US" sz="2000" dirty="0" smtClean="0">
+                <a:hlinkClick r:id="rId4"/>
+              </a:rPr>
+              <a:t>vldb.org/pvldb/vol5/p2018_lisegetoor_vldb2012.pdf</a:t>
+            </a:r>
+            <a:r>
+              <a:rPr lang="en-US" sz="2000" dirty="0" smtClean="0"/>
+              <a:t> </a:t>
+            </a:r>
+            <a:endParaRPr lang="en-US" sz="2000" dirty="0"/>
+          </a:p>
+          <a:p>
+            <a:pPr marL="457200" indent="-457200">
+              <a:buFont typeface="+mj-lt"/>
+              <a:buAutoNum type="arabicPeriod"/>
+            </a:pPr>
+            <a:r>
+              <a:rPr lang="en-US" sz="2000" dirty="0" smtClean="0">
+                <a:hlinkClick r:id="rId5"/>
+              </a:rPr>
+              <a:t>https</a:t>
+            </a:r>
+            <a:r>
+              <a:rPr lang="en-US" sz="2000" dirty="0">
+                <a:hlinkClick r:id="rId5"/>
+              </a:rPr>
+              <a:t>://</a:t>
+            </a:r>
+            <a:r>
+              <a:rPr lang="en-US" sz="2000" dirty="0" smtClean="0">
+                <a:hlinkClick r:id="rId5"/>
+              </a:rPr>
+              <a:t>cran.r-project.org/web/packages/qualV/index.html</a:t>
+            </a:r>
+            <a:endParaRPr lang="en-US" sz="2000" dirty="0"/>
+          </a:p>
+          <a:p>
+            <a:pPr marL="457200" indent="-457200">
+              <a:buFont typeface="+mj-lt"/>
+              <a:buAutoNum type="arabicPeriod"/>
+            </a:pPr>
+            <a:r>
+              <a:rPr lang="en-US" sz="2000" dirty="0" smtClean="0">
+                <a:hlinkClick r:id="rId6"/>
+              </a:rPr>
+              <a:t>https</a:t>
+            </a:r>
+            <a:r>
+              <a:rPr lang="en-US" sz="2000" dirty="0">
+                <a:hlinkClick r:id="rId6"/>
+              </a:rPr>
+              <a:t>://</a:t>
+            </a:r>
+            <a:r>
+              <a:rPr lang="en-US" sz="2000" dirty="0" smtClean="0">
+                <a:hlinkClick r:id="rId6"/>
+              </a:rPr>
+              <a:t>cran.r-project.org/web/packages/stringdist/stringdist.pdf</a:t>
+            </a:r>
+            <a:endParaRPr lang="en-US" sz="2000" dirty="0" smtClean="0"/>
+          </a:p>
+          <a:p>
+            <a:pPr marL="457200" indent="-457200">
+              <a:buFont typeface="+mj-lt"/>
+              <a:buAutoNum type="arabicPeriod"/>
+            </a:pPr>
+            <a:r>
+              <a:rPr lang="en-US" sz="2000" i="1" dirty="0" smtClean="0"/>
+              <a:t>H </a:t>
+            </a:r>
+            <a:r>
+              <a:rPr lang="en-US" sz="2000" i="1" dirty="0" err="1"/>
+              <a:t>Kardes</a:t>
+            </a:r>
+            <a:r>
+              <a:rPr lang="en-US" sz="2000" i="1" dirty="0"/>
+              <a:t>, </a:t>
+            </a:r>
+            <a:r>
+              <a:rPr lang="en-US" sz="2000" i="1" dirty="0" smtClean="0"/>
+              <a:t>D </a:t>
+            </a:r>
+            <a:r>
+              <a:rPr lang="en-US" sz="2000" i="1" dirty="0" err="1" smtClean="0"/>
+              <a:t>Konidena</a:t>
+            </a:r>
+            <a:r>
+              <a:rPr lang="en-US" sz="2000" i="1" dirty="0" smtClean="0"/>
+              <a:t> et. al,</a:t>
+            </a:r>
+            <a:r>
+              <a:rPr lang="en-US" sz="2000" b="1" i="1" dirty="0" smtClean="0"/>
+              <a:t> Graph-based </a:t>
+            </a:r>
+            <a:r>
+              <a:rPr lang="en-US" sz="2000" b="1" i="1" dirty="0"/>
+              <a:t>Approaches for Organization Entity Resolution in </a:t>
+            </a:r>
+            <a:r>
+              <a:rPr lang="en-US" sz="2000" b="1" i="1" dirty="0" smtClean="0"/>
+              <a:t>MapReduce</a:t>
+            </a:r>
+          </a:p>
+          <a:p>
+            <a:pPr marL="457200" indent="-457200">
+              <a:buFont typeface="+mj-lt"/>
+              <a:buAutoNum type="arabicPeriod"/>
+            </a:pPr>
+            <a:r>
+              <a:rPr lang="en-US" sz="2000" i="1" dirty="0" smtClean="0"/>
+              <a:t>H Huang et. al</a:t>
+            </a:r>
+            <a:r>
+              <a:rPr lang="en-US" sz="2000" dirty="0" smtClean="0"/>
+              <a:t>, </a:t>
+            </a:r>
+            <a:r>
+              <a:rPr lang="en-US" sz="2000" b="1" i="1" dirty="0" smtClean="0"/>
+              <a:t>Leveraging </a:t>
+            </a:r>
+            <a:r>
+              <a:rPr lang="en-US" sz="2000" b="1" i="1" dirty="0"/>
+              <a:t>Deep Neural Networks and Knowledge Graphs</a:t>
+            </a:r>
+            <a:br>
+              <a:rPr lang="en-US" sz="2000" b="1" i="1" dirty="0"/>
+            </a:br>
+            <a:r>
+              <a:rPr lang="en-US" sz="2000" b="1" i="1" dirty="0"/>
+              <a:t>for Entity Disambiguation</a:t>
+            </a:r>
+            <a:r>
+              <a:rPr lang="en-US" sz="2000" b="1" i="1" dirty="0"/>
+              <a:t> </a:t>
+            </a:r>
+            <a:endParaRPr lang="en-US" sz="2000" b="1" i="1" dirty="0" smtClean="0"/>
+          </a:p>
+          <a:p>
+            <a:pPr marL="457200" indent="-457200">
+              <a:buFont typeface="+mj-lt"/>
+              <a:buAutoNum type="arabicPeriod"/>
+            </a:pPr>
+            <a:r>
+              <a:rPr lang="en-US" sz="2000" dirty="0" smtClean="0"/>
+              <a:t>P Singla, P </a:t>
+            </a:r>
+            <a:r>
+              <a:rPr lang="en-US" sz="2000" dirty="0" err="1" smtClean="0"/>
+              <a:t>Domingos</a:t>
+            </a:r>
+            <a:r>
+              <a:rPr lang="en-US" sz="2000" dirty="0" smtClean="0"/>
+              <a:t>, </a:t>
+            </a:r>
+            <a:r>
+              <a:rPr lang="en-US" sz="2000" b="1" i="1" dirty="0" smtClean="0"/>
+              <a:t>Entity </a:t>
+            </a:r>
+            <a:r>
+              <a:rPr lang="en-US" sz="2000" b="1" i="1" dirty="0"/>
+              <a:t>Resolution with Markov Logic</a:t>
+            </a:r>
+            <a:r>
+              <a:rPr lang="en-US" sz="2000" i="1" dirty="0"/>
+              <a:t> </a:t>
+            </a:r>
+            <a:endParaRPr lang="en-US" sz="2000" i="1" dirty="0" smtClean="0"/>
+          </a:p>
+          <a:p>
+            <a:pPr marL="0" indent="0">
+              <a:buNone/>
+            </a:pPr>
+            <a:r>
+              <a:rPr lang="en-US" sz="2000" i="1" dirty="0"/>
+              <a:t/>
+            </a:r>
+            <a:br>
+              <a:rPr lang="en-US" sz="2000" i="1" dirty="0"/>
+            </a:br>
+            <a:r>
+              <a:rPr lang="en-US" sz="2000" dirty="0"/>
+              <a:t/>
+            </a:r>
+            <a:br>
+              <a:rPr lang="en-US" sz="2000" dirty="0"/>
+            </a:br>
+            <a:r>
+              <a:rPr lang="en-US" sz="2000" dirty="0" smtClean="0"/>
+              <a:t> </a:t>
+            </a:r>
+            <a:r>
+              <a:rPr lang="en-US" sz="2000" dirty="0"/>
+              <a:t/>
+            </a:r>
+            <a:br>
+              <a:rPr lang="en-US" sz="2000" dirty="0"/>
+            </a:br>
+            <a:r>
+              <a:rPr lang="en-US" sz="2000" dirty="0"/>
+              <a:t/>
+            </a:r>
+            <a:br>
+              <a:rPr lang="en-US" sz="2000" dirty="0"/>
+            </a:br>
+            <a:endParaRPr lang="en-US" sz="2000" dirty="0"/>
+          </a:p>
+          <a:p>
+            <a:pPr marL="457200" indent="-457200">
+              <a:buFont typeface="+mj-lt"/>
+              <a:buAutoNum type="arabicPeriod"/>
+            </a:pPr>
+            <a:endParaRPr lang="en-US" sz="2000" dirty="0"/>
+          </a:p>
+        </p:txBody>
+      </p:sp>
       <p:sp>
         <p:nvSpPr>
           <p:cNvPr id="3" name="Title 2"/>
@@ -7301,7 +7837,7 @@
           <a:p>
             <a:r>
               <a:rPr lang="en-US" dirty="0" smtClean="0"/>
-              <a:t>Questions?</a:t>
+              <a:t>References</a:t>
             </a:r>
             <a:endParaRPr lang="en-US" dirty="0"/>
           </a:p>
@@ -7369,7 +7905,7 @@
             </a:pPr>
             <a:fld id="{D6BE58A1-A4A9-468D-9971-E4F582D1F085}" type="datetime5">
               <a:rPr lang="en-US" smtClean="0"/>
-              <a:t>15-Nov-16</a:t>
+              <a:t>3-Dec-16</a:t>
             </a:fld>
             <a:endParaRPr lang="en-US"/>
           </a:p>
@@ -7407,7 +7943,7 @@
     </p:spTree>
     <p:extLst>
       <p:ext uri="{BB962C8B-B14F-4D97-AF65-F5344CB8AC3E}">
-        <p14:creationId xmlns:p14="http://schemas.microsoft.com/office/powerpoint/2010/main" val="55439111"/>
+        <p14:creationId xmlns:p14="http://schemas.microsoft.com/office/powerpoint/2010/main" val="281445289"/>
       </p:ext>
     </p:extLst>
   </p:cSld>
@@ -7452,6 +7988,192 @@
           </p:nvPr>
         </p:nvPicPr>
         <p:blipFill>
+          <a:blip r:embed="rId2">
+            <a:extLst>
+              <a:ext uri="{28A0092B-C50C-407E-A947-70E740481C1C}">
+                <a14:useLocalDpi xmlns:a14="http://schemas.microsoft.com/office/drawing/2010/main" val="0"/>
+              </a:ext>
+            </a:extLst>
+          </a:blip>
+          <a:stretch>
+            <a:fillRect/>
+          </a:stretch>
+        </p:blipFill>
+        <p:spPr>
+          <a:xfrm>
+            <a:off x="2352675" y="1453356"/>
+            <a:ext cx="4286250" cy="4286250"/>
+          </a:xfrm>
+        </p:spPr>
+      </p:pic>
+      <p:sp>
+        <p:nvSpPr>
+          <p:cNvPr id="3" name="Title 2"/>
+          <p:cNvSpPr>
+            <a:spLocks noGrp="1"/>
+          </p:cNvSpPr>
+          <p:nvPr>
+            <p:ph type="title"/>
+          </p:nvPr>
+        </p:nvSpPr>
+        <p:spPr/>
+        <p:txBody>
+          <a:bodyPr/>
+          <a:lstStyle/>
+          <a:p>
+            <a:r>
+              <a:rPr lang="en-US" dirty="0" smtClean="0"/>
+              <a:t>Questions?</a:t>
+            </a:r>
+            <a:endParaRPr lang="en-US" dirty="0"/>
+          </a:p>
+        </p:txBody>
+      </p:sp>
+      <p:sp>
+        <p:nvSpPr>
+          <p:cNvPr id="9" name="TextBox 8"/>
+          <p:cNvSpPr txBox="1"/>
+          <p:nvPr/>
+        </p:nvSpPr>
+        <p:spPr>
+          <a:xfrm>
+            <a:off x="3429000" y="6553200"/>
+            <a:ext cx="1066800" cy="276999"/>
+          </a:xfrm>
+          <a:prstGeom prst="rect">
+            <a:avLst/>
+          </a:prstGeom>
+          <a:solidFill>
+            <a:schemeClr val="tx1"/>
+          </a:solidFill>
+        </p:spPr>
+        <p:txBody>
+          <a:bodyPr wrap="square" rtlCol="0">
+            <a:spAutoFit/>
+          </a:bodyPr>
+          <a:lstStyle/>
+          <a:p>
+            <a:r>
+              <a:rPr lang="en-US" sz="1200" dirty="0" smtClean="0">
+                <a:solidFill>
+                  <a:schemeClr val="bg1"/>
+                </a:solidFill>
+                <a:latin typeface="+mn-lt"/>
+              </a:rPr>
+              <a:t>Sohom Ghosh</a:t>
+            </a:r>
+            <a:endParaRPr lang="en-US" sz="1200" dirty="0">
+              <a:solidFill>
+                <a:schemeClr val="bg1"/>
+              </a:solidFill>
+              <a:latin typeface="+mn-lt"/>
+            </a:endParaRPr>
+          </a:p>
+        </p:txBody>
+      </p:sp>
+      <p:sp>
+        <p:nvSpPr>
+          <p:cNvPr id="10" name="Date Placeholder 9"/>
+          <p:cNvSpPr>
+            <a:spLocks noGrp="1"/>
+          </p:cNvSpPr>
+          <p:nvPr>
+            <p:ph type="dt" sz="half" idx="10"/>
+          </p:nvPr>
+        </p:nvSpPr>
+        <p:spPr/>
+        <p:txBody>
+          <a:bodyPr/>
+          <a:lstStyle/>
+          <a:p>
+            <a:pPr>
+              <a:defRPr/>
+            </a:pPr>
+            <a:fld id="{D6BE58A1-A4A9-468D-9971-E4F582D1F085}" type="datetime5">
+              <a:rPr lang="en-US" smtClean="0"/>
+              <a:t>3-Dec-16</a:t>
+            </a:fld>
+            <a:endParaRPr lang="en-US"/>
+          </a:p>
+        </p:txBody>
+      </p:sp>
+      <p:sp>
+        <p:nvSpPr>
+          <p:cNvPr id="11" name="Slide Number Placeholder 10"/>
+          <p:cNvSpPr>
+            <a:spLocks noGrp="1"/>
+          </p:cNvSpPr>
+          <p:nvPr>
+            <p:ph type="sldNum" sz="quarter" idx="12"/>
+          </p:nvPr>
+        </p:nvSpPr>
+        <p:spPr/>
+        <p:txBody>
+          <a:bodyPr/>
+          <a:lstStyle/>
+          <a:p>
+            <a:pPr>
+              <a:defRPr/>
+            </a:pPr>
+            <a:fld id="{5BC7FEBF-A170-470C-A369-F0D066FB58E5}" type="slidenum">
+              <a:rPr lang="en-US" smtClean="0"/>
+              <a:pPr>
+                <a:defRPr/>
+              </a:pPr>
+              <a:t>14</a:t>
+            </a:fld>
+            <a:endParaRPr lang="en-US"/>
+          </a:p>
+        </p:txBody>
+      </p:sp>
+    </p:spTree>
+    <p:extLst>
+      <p:ext uri="{BB962C8B-B14F-4D97-AF65-F5344CB8AC3E}">
+        <p14:creationId xmlns:p14="http://schemas.microsoft.com/office/powerpoint/2010/main" val="55439111"/>
+      </p:ext>
+    </p:extLst>
+  </p:cSld>
+  <p:clrMapOvr>
+    <a:masterClrMapping/>
+  </p:clrMapOvr>
+  <p:timing>
+    <p:tnLst>
+      <p:par>
+        <p:cTn id="1" dur="indefinite" restart="never" nodeType="tmRoot"/>
+      </p:par>
+    </p:tnLst>
+  </p:timing>
+</p:sld>
+</file>
+
+<file path=ppt/slides/slide15.xml><?xml version="1.0" encoding="utf-8"?>
+<p:sld xmlns:a="http://schemas.openxmlformats.org/drawingml/2006/main" xmlns:r="http://schemas.openxmlformats.org/officeDocument/2006/relationships" xmlns:p="http://schemas.openxmlformats.org/presentationml/2006/main">
+  <p:cSld>
+    <p:spTree>
+      <p:nvGrpSpPr>
+        <p:cNvPr id="1" name=""/>
+        <p:cNvGrpSpPr/>
+        <p:nvPr/>
+      </p:nvGrpSpPr>
+      <p:grpSpPr>
+        <a:xfrm>
+          <a:off x="0" y="0"/>
+          <a:ext cx="0" cy="0"/>
+          <a:chOff x="0" y="0"/>
+          <a:chExt cx="0" cy="0"/>
+        </a:xfrm>
+      </p:grpSpPr>
+      <p:pic>
+        <p:nvPicPr>
+          <p:cNvPr id="4" name="Content Placeholder 3"/>
+          <p:cNvPicPr>
+            <a:picLocks noGrp="1" noChangeAspect="1"/>
+          </p:cNvPicPr>
+          <p:nvPr>
+            <p:ph idx="1"/>
+          </p:nvPr>
+        </p:nvPicPr>
+        <p:blipFill>
           <a:blip r:embed="rId2" cstate="print">
             <a:extLst>
               <a:ext uri="{28A0092B-C50C-407E-A947-70E740481C1C}">
@@ -7555,7 +8277,7 @@
             </a:pPr>
             <a:fld id="{D6BE58A1-A4A9-468D-9971-E4F582D1F085}" type="datetime5">
               <a:rPr lang="en-US" smtClean="0"/>
-              <a:t>15-Nov-16</a:t>
+              <a:t>3-Dec-16</a:t>
             </a:fld>
             <a:endParaRPr lang="en-US"/>
           </a:p>
@@ -7584,7 +8306,7 @@
               <a:pPr>
                 <a:defRPr/>
               </a:pPr>
-              <a:t>14</a:t>
+              <a:t>15</a:t>
             </a:fld>
             <a:endParaRPr lang="en-US"/>
           </a:p>
@@ -7651,19 +8373,31 @@
             </a:r>
             <a:r>
               <a:rPr lang="en-US" sz="2000" dirty="0" smtClean="0"/>
-              <a:t>Sample (Test Set)</a:t>
-            </a:r>
-          </a:p>
-          <a:p>
-            <a:r>
-              <a:rPr lang="en-US" sz="2000" dirty="0"/>
-              <a:t>&lt;count of occurrence, </a:t>
+              <a:t>Samples </a:t>
             </a:r>
             <a:r>
               <a:rPr lang="en-US" sz="2000" dirty="0" smtClean="0"/>
+              <a:t>(</a:t>
+            </a:r>
+            <a:r>
+              <a:rPr lang="en-US" sz="2000" b="1" dirty="0" smtClean="0"/>
+              <a:t>Test Set</a:t>
+            </a:r>
+            <a:r>
+              <a:rPr lang="en-US" sz="2000" dirty="0" smtClean="0"/>
+              <a:t>)</a:t>
+            </a:r>
+          </a:p>
+          <a:p>
+            <a:r>
+              <a:rPr lang="en-US" sz="2000" b="1" i="1" dirty="0" smtClean="0"/>
+              <a:t>&lt;frequency, </a:t>
+            </a:r>
+            <a:r>
+              <a:rPr lang="en-US" sz="2000" b="1" i="1" dirty="0" smtClean="0"/>
               <a:t>company name&gt;</a:t>
             </a:r>
-            <a:endParaRPr lang="en-US" sz="2000" dirty="0"/>
+            <a:endParaRPr lang="en-US" sz="2000" b="1" i="1" dirty="0"/>
           </a:p>
         </p:txBody>
       </p:sp>
@@ -7710,7 +8444,7 @@
             </a:pPr>
             <a:fld id="{D6BE58A1-A4A9-468D-9971-E4F582D1F085}" type="datetime5">
               <a:rPr lang="en-US" smtClean="0"/>
-              <a:t>15-Nov-16</a:t>
+              <a:t>3-Dec-16</a:t>
             </a:fld>
             <a:endParaRPr lang="en-US"/>
           </a:p>
@@ -7807,16 +8541,28 @@
           <a:p>
             <a:r>
               <a:rPr lang="en-US" sz="2000" dirty="0" smtClean="0"/>
-              <a:t>Company </a:t>
+              <a:t>Company clusters </a:t>
             </a:r>
             <a:r>
               <a:rPr lang="en-US" sz="2000" dirty="0" smtClean="0"/>
-              <a:t>clusters sample (Training set)</a:t>
-            </a:r>
-          </a:p>
-          <a:p>
+              <a:t>(</a:t>
+            </a:r>
+            <a:r>
+              <a:rPr lang="en-US" sz="2000" b="1" dirty="0" smtClean="0"/>
+              <a:t>Training </a:t>
+            </a:r>
+            <a:r>
+              <a:rPr lang="en-US" sz="2000" b="1" dirty="0" smtClean="0"/>
+              <a:t>set</a:t>
+            </a:r>
             <a:r>
               <a:rPr lang="en-US" sz="2000" dirty="0" smtClean="0"/>
+              <a:t>)</a:t>
+            </a:r>
+          </a:p>
+          <a:p>
+            <a:r>
+              <a:rPr lang="en-US" sz="2000" b="1" i="1" dirty="0" smtClean="0"/>
               <a:t>&lt;cluster id, company name&gt;</a:t>
             </a:r>
           </a:p>
@@ -7840,8 +8586,8 @@
         </p:blipFill>
         <p:spPr>
           <a:xfrm>
-            <a:off x="4800599" y="2847975"/>
-            <a:ext cx="4191001" cy="2409825"/>
+            <a:off x="4742621" y="2819400"/>
+            <a:ext cx="4248980" cy="2443163"/>
           </a:xfrm>
           <a:prstGeom prst="rect">
             <a:avLst/>
@@ -7863,14 +8609,44 @@
         </p:blipFill>
         <p:spPr>
           <a:xfrm>
-            <a:off x="228601" y="2847975"/>
-            <a:ext cx="4419600" cy="2409825"/>
+            <a:off x="76200" y="2847975"/>
+            <a:ext cx="4267199" cy="2414588"/>
           </a:xfrm>
           <a:prstGeom prst="rect">
             <a:avLst/>
           </a:prstGeom>
         </p:spPr>
       </p:pic>
+      <p:cxnSp>
+        <p:nvCxnSpPr>
+          <p:cNvPr id="4" name="Straight Connector 3"/>
+          <p:cNvCxnSpPr/>
+          <p:nvPr/>
+        </p:nvCxnSpPr>
+        <p:spPr>
+          <a:xfrm>
+            <a:off x="4419600" y="746125"/>
+            <a:ext cx="152399" cy="5730875"/>
+          </a:xfrm>
+          <a:prstGeom prst="line">
+            <a:avLst/>
+          </a:prstGeom>
+        </p:spPr>
+        <p:style>
+          <a:lnRef idx="1">
+            <a:schemeClr val="accent1"/>
+          </a:lnRef>
+          <a:fillRef idx="0">
+            <a:schemeClr val="accent1"/>
+          </a:fillRef>
+          <a:effectRef idx="0">
+            <a:schemeClr val="accent1"/>
+          </a:effectRef>
+          <a:fontRef idx="minor">
+            <a:schemeClr val="tx1"/>
+          </a:fontRef>
+        </p:style>
+      </p:cxnSp>
     </p:spTree>
     <p:extLst>
       <p:ext uri="{BB962C8B-B14F-4D97-AF65-F5344CB8AC3E}">
@@ -7928,11 +8704,7 @@
           <a:p>
             <a:r>
               <a:rPr lang="en-US" sz="2000" b="1" dirty="0" smtClean="0"/>
-              <a:t>Given</a:t>
-            </a:r>
-            <a:r>
-              <a:rPr lang="en-US" sz="2000" b="1" dirty="0" smtClean="0"/>
-              <a:t>:</a:t>
+              <a:t>Given:</a:t>
             </a:r>
             <a:r>
               <a:rPr lang="en-US" sz="2000" dirty="0" smtClean="0"/>
@@ -7957,11 +8729,11 @@
           <a:p>
             <a:pPr lvl="2"/>
             <a:r>
-              <a:rPr lang="en-US" sz="1600" dirty="0"/>
+              <a:rPr lang="en-US" sz="1600" b="1" i="1" dirty="0"/>
               <a:t>&lt;cluster id, company name</a:t>
             </a:r>
             <a:r>
-              <a:rPr lang="en-US" sz="1600" dirty="0" smtClean="0"/>
+              <a:rPr lang="en-US" sz="1600" b="1" i="1" dirty="0" smtClean="0"/>
               <a:t>&gt;</a:t>
             </a:r>
           </a:p>
@@ -7975,11 +8747,11 @@
           <a:p>
             <a:pPr lvl="2"/>
             <a:r>
-              <a:rPr lang="en-US" sz="1600" dirty="0"/>
+              <a:rPr lang="en-US" sz="1600" b="1" i="1" dirty="0"/>
               <a:t>&lt;count of occurrence, company name</a:t>
             </a:r>
             <a:r>
-              <a:rPr lang="en-US" sz="1600" dirty="0" smtClean="0"/>
+              <a:rPr lang="en-US" sz="1600" b="1" i="1" dirty="0" smtClean="0"/>
               <a:t>&gt;</a:t>
             </a:r>
           </a:p>
@@ -8016,7 +8788,6 @@
               <a:rPr lang="en-US" sz="2000" b="1" dirty="0" smtClean="0"/>
               <a:t>Key points:</a:t>
             </a:r>
-            <a:endParaRPr lang="en-US" sz="2000" b="1" dirty="0" smtClean="0"/>
           </a:p>
           <a:p>
             <a:pPr lvl="1"/>
@@ -8132,7 +8903,7 @@
             </a:pPr>
             <a:fld id="{D6BE58A1-A4A9-468D-9971-E4F582D1F085}" type="datetime5">
               <a:rPr lang="en-US" smtClean="0"/>
-              <a:t>15-Nov-16</a:t>
+              <a:t>3-Dec-16</a:t>
             </a:fld>
             <a:endParaRPr lang="en-US"/>
           </a:p>
@@ -8229,13 +9000,16 @@
               <a:rPr lang="en-US" sz="2000" b="1" dirty="0" smtClean="0"/>
               <a:t>Preprocessing</a:t>
             </a:r>
-            <a:endParaRPr lang="en-US" sz="2000" b="1" dirty="0" smtClean="0"/>
           </a:p>
           <a:p>
             <a:pPr lvl="1"/>
             <a:r>
+              <a:rPr lang="en-US" sz="1800" b="1" dirty="0" smtClean="0"/>
+              <a:t>Removed common terms</a:t>
+            </a:r>
+            <a:r>
               <a:rPr lang="en-US" sz="1800" dirty="0" smtClean="0"/>
-              <a:t>Removed common terms like “services”, special characters and white spaces</a:t>
+              <a:t> like “services”, special characters and white spaces</a:t>
             </a:r>
           </a:p>
           <a:p>
@@ -8299,13 +9073,17 @@
             <a:pPr lvl="2"/>
             <a:r>
               <a:rPr lang="en-US" sz="1800" dirty="0"/>
-              <a:t>Clustering based on common sequence of </a:t>
-            </a:r>
-            <a:r>
-              <a:rPr lang="en-US" sz="1800" dirty="0" smtClean="0"/>
+              <a:t>Clustering based on </a:t>
+            </a:r>
+            <a:r>
+              <a:rPr lang="en-US" sz="1800" b="1" dirty="0"/>
+              <a:t>common sequence of </a:t>
+            </a:r>
+            <a:r>
+              <a:rPr lang="en-US" sz="1800" b="1" dirty="0" smtClean="0"/>
               <a:t>characters</a:t>
             </a:r>
-            <a:endParaRPr lang="en-US" sz="1800" dirty="0"/>
+            <a:endParaRPr lang="en-US" sz="1800" b="1" dirty="0"/>
           </a:p>
           <a:p>
             <a:pPr lvl="1"/>
@@ -8318,10 +9096,14 @@
             <a:pPr lvl="2"/>
             <a:r>
               <a:rPr lang="en-US" sz="1800" dirty="0"/>
-              <a:t>Clustering based on cosine similarity of feature </a:t>
-            </a:r>
-            <a:r>
-              <a:rPr lang="en-US" sz="1800" dirty="0" smtClean="0"/>
+              <a:t>Clustering based on </a:t>
+            </a:r>
+            <a:r>
+              <a:rPr lang="en-US" sz="1800" b="1" dirty="0"/>
+              <a:t>cosine similarity of feature </a:t>
+            </a:r>
+            <a:r>
+              <a:rPr lang="en-US" sz="1800" b="1" dirty="0" smtClean="0"/>
               <a:t>vectors</a:t>
             </a:r>
           </a:p>
@@ -8412,7 +9194,7 @@
             </a:pPr>
             <a:fld id="{D6BE58A1-A4A9-468D-9971-E4F582D1F085}" type="datetime5">
               <a:rPr lang="en-US" smtClean="0"/>
-              <a:t>15-Nov-16</a:t>
+              <a:t>3-Dec-16</a:t>
             </a:fld>
             <a:endParaRPr lang="en-US"/>
           </a:p>
@@ -8504,11 +9286,7 @@
           <a:p>
             <a:r>
               <a:rPr lang="en-US" sz="2000" b="1" dirty="0" smtClean="0"/>
-              <a:t>Approach </a:t>
-            </a:r>
-            <a:r>
-              <a:rPr lang="en-US" sz="2000" b="1" dirty="0" smtClean="0"/>
-              <a:t>1</a:t>
+              <a:t>Approach 1</a:t>
             </a:r>
           </a:p>
           <a:p>
@@ -8522,7 +9300,15 @@
             <a:pPr lvl="1"/>
             <a:r>
               <a:rPr lang="en-US" sz="1800" dirty="0" smtClean="0"/>
-              <a:t>Length of longest common subsequence is: 14</a:t>
+              <a:t>Length of </a:t>
+            </a:r>
+            <a:r>
+              <a:rPr lang="en-US" sz="1800" b="1" dirty="0" smtClean="0"/>
+              <a:t>longest common subsequence</a:t>
+            </a:r>
+            <a:r>
+              <a:rPr lang="en-US" sz="1800" dirty="0" smtClean="0"/>
+              <a:t> is: 14</a:t>
             </a:r>
           </a:p>
           <a:p>
@@ -8531,11 +9317,7 @@
           <a:p>
             <a:r>
               <a:rPr lang="en-US" sz="2000" b="1" dirty="0" smtClean="0"/>
-              <a:t>Approach </a:t>
-            </a:r>
-            <a:r>
-              <a:rPr lang="en-US" sz="2000" b="1" dirty="0" smtClean="0"/>
-              <a:t>2</a:t>
+              <a:t>Approach 2</a:t>
             </a:r>
           </a:p>
           <a:p>
@@ -8577,8 +9359,12 @@
           <a:p>
             <a:pPr lvl="1"/>
             <a:r>
+              <a:rPr lang="en-US" sz="1800" b="1" dirty="0" smtClean="0"/>
+              <a:t>Cosine similarity </a:t>
+            </a:r>
+            <a:r>
               <a:rPr lang="en-US" sz="1800" dirty="0" smtClean="0"/>
-              <a:t>Cosine similarity between vectors [only the dimensions where either of them exists are considered]</a:t>
+              <a:t>between vectors [only the dimensions where either of them exists are considered]</a:t>
             </a:r>
           </a:p>
         </p:txBody>
@@ -8668,7 +9454,7 @@
             </a:pPr>
             <a:fld id="{D6BE58A1-A4A9-468D-9971-E4F582D1F085}" type="datetime5">
               <a:rPr lang="en-US" smtClean="0"/>
-              <a:t>15-Nov-16</a:t>
+              <a:t>3-Dec-16</a:t>
             </a:fld>
             <a:endParaRPr lang="en-US"/>
           </a:p>
@@ -9229,28 +10015,24 @@
           <a:p>
             <a:r>
               <a:rPr lang="en-US" sz="2000" b="1" dirty="0" smtClean="0"/>
-              <a:t>Preprocessing </a:t>
-            </a:r>
-            <a:r>
-              <a:rPr lang="en-US" sz="2000" b="1" dirty="0" smtClean="0"/>
-              <a:t>(preprocess.py) </a:t>
+              <a:t>Preprocessing (preprocess.py) </a:t>
             </a:r>
           </a:p>
           <a:p>
             <a:pPr lvl="1"/>
             <a:r>
-              <a:rPr lang="en-US" sz="1800" dirty="0">
+              <a:rPr lang="en-US" sz="1600" dirty="0">
                 <a:hlinkClick r:id="rId2"/>
               </a:rPr>
               <a:t>https://</a:t>
             </a:r>
             <a:r>
-              <a:rPr lang="en-US" sz="1800" dirty="0" smtClean="0">
+              <a:rPr lang="en-US" sz="1600" dirty="0" smtClean="0">
                 <a:hlinkClick r:id="rId2"/>
               </a:rPr>
               <a:t>github.com/sohomghosh/company_clustering/blob/master/preprocess.py</a:t>
             </a:r>
-            <a:endParaRPr lang="en-US" sz="1800" dirty="0" smtClean="0"/>
+            <a:endParaRPr lang="en-US" sz="1600" dirty="0" smtClean="0"/>
           </a:p>
           <a:p>
             <a:endParaRPr lang="en-US" sz="2000" b="1" dirty="0" smtClean="0"/>
@@ -9272,18 +10054,18 @@
           <a:p>
             <a:pPr lvl="1"/>
             <a:r>
-              <a:rPr lang="en-US" sz="1800" dirty="0">
+              <a:rPr lang="en-US" sz="1600" dirty="0">
                 <a:hlinkClick r:id="rId3"/>
               </a:rPr>
               <a:t>https://</a:t>
             </a:r>
             <a:r>
-              <a:rPr lang="en-US" sz="1800" dirty="0" smtClean="0">
+              <a:rPr lang="en-US" sz="1600" dirty="0" smtClean="0">
                 <a:hlinkClick r:id="rId3"/>
               </a:rPr>
               <a:t>github.com/sohomghosh/company_clustering/blob/master/model_code.R</a:t>
             </a:r>
-            <a:endParaRPr lang="en-US" sz="1800" dirty="0" smtClean="0"/>
+            <a:endParaRPr lang="en-US" sz="1600" dirty="0" smtClean="0"/>
           </a:p>
           <a:p>
             <a:pPr marL="457200" lvl="1" indent="0">
@@ -9378,7 +10160,7 @@
             </a:pPr>
             <a:fld id="{D6BE58A1-A4A9-468D-9971-E4F582D1F085}" type="datetime5">
               <a:rPr lang="en-US" smtClean="0"/>
-              <a:t>15-Nov-16</a:t>
+              <a:t>3-Dec-16</a:t>
             </a:fld>
             <a:endParaRPr lang="en-US"/>
           </a:p>
@@ -9470,11 +10252,7 @@
           <a:p>
             <a:r>
               <a:rPr lang="en-US" sz="2000" b="1" dirty="0" smtClean="0"/>
-              <a:t>Approach </a:t>
-            </a:r>
-            <a:r>
-              <a:rPr lang="en-US" sz="2000" b="1" dirty="0" smtClean="0"/>
-              <a:t>– 1</a:t>
+              <a:t>Approach – 1</a:t>
             </a:r>
           </a:p>
           <a:p>
@@ -9529,11 +10307,7 @@
           <a:p>
             <a:r>
               <a:rPr lang="en-US" sz="2000" b="1" dirty="0" smtClean="0"/>
-              <a:t>Approach </a:t>
-            </a:r>
-            <a:r>
-              <a:rPr lang="en-US" sz="2000" b="1" dirty="0" smtClean="0"/>
-              <a:t>– 2 </a:t>
+              <a:t>Approach – 2 </a:t>
             </a:r>
           </a:p>
           <a:p>
@@ -9680,7 +10454,7 @@
             </a:pPr>
             <a:fld id="{D6BE58A1-A4A9-468D-9971-E4F582D1F085}" type="datetime5">
               <a:rPr lang="en-US" smtClean="0"/>
-              <a:t>15-Nov-16</a:t>
+              <a:t>3-Dec-16</a:t>
             </a:fld>
             <a:endParaRPr lang="en-US"/>
           </a:p>
@@ -9774,14 +10548,10 @@
             <a:pPr fontAlgn="b"/>
             <a:r>
               <a:rPr lang="en-US" sz="2000" dirty="0" smtClean="0"/>
-              <a:t>Companies </a:t>
-            </a:r>
-            <a:r>
-              <a:rPr lang="en-US" sz="2000" dirty="0" smtClean="0"/>
-              <a:t>like “</a:t>
-            </a:r>
-            <a:r>
-              <a:rPr lang="en-US" sz="2000" dirty="0" err="1" smtClean="0"/>
+              <a:t>Companies like “</a:t>
+            </a:r>
+            <a:r>
+              <a:rPr lang="en-US" sz="2000" b="1" dirty="0" err="1" smtClean="0"/>
               <a:t>anitechnologies</a:t>
             </a:r>
             <a:r>
@@ -9789,16 +10559,12 @@
               <a:t>”, “</a:t>
             </a:r>
             <a:r>
-              <a:rPr lang="en-US" sz="2000" dirty="0" err="1" smtClean="0"/>
+              <a:rPr lang="en-US" sz="2000" b="1" dirty="0" err="1" smtClean="0"/>
               <a:t>anitechnologiesolacabs</a:t>
             </a:r>
             <a:r>
               <a:rPr lang="en-US" sz="2000" dirty="0" smtClean="0"/>
-              <a:t>” have similar cluster </a:t>
-            </a:r>
-            <a:r>
-              <a:rPr lang="en-US" sz="2000" dirty="0" smtClean="0"/>
-              <a:t>distributions</a:t>
+              <a:t>” have similar cluster distributions</a:t>
             </a:r>
             <a:endParaRPr lang="en-US" sz="2000" dirty="0"/>
           </a:p>
@@ -9829,18 +10595,26 @@
             <a:pPr lvl="1"/>
             <a:r>
               <a:rPr lang="en-US" sz="1800" dirty="0"/>
-              <a:t>Setting a optimal </a:t>
+              <a:t>Setting a </a:t>
+            </a:r>
+            <a:r>
+              <a:rPr lang="en-US" sz="1800" b="1" dirty="0"/>
+              <a:t>optimal </a:t>
+            </a:r>
+            <a:r>
+              <a:rPr lang="en-US" sz="1800" b="1" dirty="0" smtClean="0"/>
+              <a:t>threshold</a:t>
+            </a:r>
+          </a:p>
+          <a:p>
+            <a:pPr lvl="1"/>
+            <a:r>
+              <a:rPr lang="en-US" sz="1800" b="1" dirty="0" smtClean="0"/>
+              <a:t>Scaling</a:t>
             </a:r>
             <a:r>
               <a:rPr lang="en-US" sz="1800" dirty="0" smtClean="0"/>
-              <a:t>threshold</a:t>
-            </a:r>
-          </a:p>
-          <a:p>
-            <a:pPr lvl="1"/>
-            <a:r>
-              <a:rPr lang="en-US" sz="1800" dirty="0" smtClean="0"/>
-              <a:t>Scaling the algorithm</a:t>
+              <a:t> the algorithm</a:t>
             </a:r>
             <a:endParaRPr lang="en-US" sz="1800" dirty="0"/>
           </a:p>
@@ -9931,7 +10705,7 @@
             </a:pPr>
             <a:fld id="{D6BE58A1-A4A9-468D-9971-E4F582D1F085}" type="datetime5">
               <a:rPr lang="en-US" smtClean="0"/>
-              <a:t>15-Nov-16</a:t>
+              <a:t>3-Dec-16</a:t>
             </a:fld>
             <a:endParaRPr lang="en-US"/>
           </a:p>
@@ -10068,24 +10842,46 @@
           </a:p>
           <a:p>
             <a:r>
+              <a:rPr lang="en-US" sz="2000" b="1" dirty="0" smtClean="0"/>
+              <a:t>Removing </a:t>
+            </a:r>
+            <a:r>
+              <a:rPr lang="en-US" sz="2000" b="1" dirty="0"/>
+              <a:t>white spaces and special characters</a:t>
+            </a:r>
+            <a:r>
+              <a:rPr lang="en-US" sz="2000" dirty="0"/>
+              <a:t> in the very first step makes it difficult for restoring back the original string.</a:t>
+            </a:r>
+          </a:p>
+          <a:p>
+            <a:endParaRPr lang="en-US" sz="2000" b="1" dirty="0" smtClean="0"/>
+          </a:p>
+          <a:p>
+            <a:r>
+              <a:rPr lang="en-US" sz="2000" b="1" dirty="0" smtClean="0"/>
+              <a:t>Machine </a:t>
+            </a:r>
+            <a:r>
+              <a:rPr lang="en-US" sz="2000" b="1" dirty="0"/>
+              <a:t>learning algorithms</a:t>
+            </a:r>
+            <a:r>
+              <a:rPr lang="en-US" sz="2000" dirty="0"/>
+              <a:t> for probabilistic classification may be used for assigning clusters.</a:t>
+            </a:r>
+          </a:p>
+          <a:p>
+            <a:endParaRPr lang="en-US" sz="2000" dirty="0" smtClean="0"/>
+          </a:p>
+          <a:p>
+            <a:r>
               <a:rPr lang="en-US" sz="2000" dirty="0" smtClean="0"/>
-              <a:t>Removing </a:t>
+              <a:t>The </a:t>
             </a:r>
             <a:r>
               <a:rPr lang="en-US" sz="2000" dirty="0"/>
-              <a:t>white spaces and special characters in the very first step makes it difficult for restoring back the original string.</a:t>
-            </a:r>
-          </a:p>
-          <a:p>
-            <a:r>
-              <a:rPr lang="en-US" sz="2000" dirty="0"/>
-              <a:t>Machine learning algorithms for probabilistic classification may be used for assigning clusters.</a:t>
-            </a:r>
-          </a:p>
-          <a:p>
-            <a:r>
-              <a:rPr lang="en-US" sz="2000" dirty="0"/>
-              <a:t>The output of the </a:t>
+              <a:t>output of the </a:t>
             </a:r>
             <a:r>
               <a:rPr lang="en-US" sz="2000" dirty="0" smtClean="0"/>
@@ -10093,8 +10889,19 @@
             </a:r>
             <a:r>
               <a:rPr lang="en-US" sz="2000" dirty="0"/>
-              <a:t>may be ensembled to produce better results.</a:t>
-            </a:r>
+              <a:t>may be </a:t>
+            </a:r>
+            <a:r>
+              <a:rPr lang="en-US" sz="2000" b="1" dirty="0"/>
+              <a:t>ensembled</a:t>
+            </a:r>
+            <a:r>
+              <a:rPr lang="en-US" sz="2000" dirty="0"/>
+              <a:t> to produce better results.</a:t>
+            </a:r>
+          </a:p>
+          <a:p>
+            <a:endParaRPr lang="en-US" sz="2000" dirty="0" smtClean="0"/>
           </a:p>
           <a:p>
             <a:r>
@@ -10102,8 +10909,20 @@
               <a:t>The </a:t>
             </a:r>
             <a:r>
+              <a:rPr lang="en-US" sz="2000" b="1" dirty="0"/>
+              <a:t>threshold</a:t>
+            </a:r>
+            <a:r>
               <a:rPr lang="en-US" sz="2000" dirty="0"/>
-              <a:t>threshold can be altered to tune the model further</a:t>
+              <a:t> can be altered to </a:t>
+            </a:r>
+            <a:r>
+              <a:rPr lang="en-US" sz="2000" b="1" dirty="0"/>
+              <a:t>tune</a:t>
+            </a:r>
+            <a:r>
+              <a:rPr lang="en-US" sz="2000" dirty="0"/>
+              <a:t> the model further</a:t>
             </a:r>
             <a:r>
               <a:rPr lang="en-US" sz="2000" dirty="0" smtClean="0"/>
@@ -10111,9 +10930,24 @@
             </a:r>
           </a:p>
           <a:p>
+            <a:endParaRPr lang="en-US" sz="2000" dirty="0" smtClean="0"/>
+          </a:p>
+          <a:p>
             <a:r>
               <a:rPr lang="en-US" sz="2000" dirty="0" smtClean="0"/>
-              <a:t>The model needs to be trained on the entire data for increasing its efficiency.</a:t>
+              <a:t>The </a:t>
+            </a:r>
+            <a:r>
+              <a:rPr lang="en-US" sz="2000" dirty="0" smtClean="0"/>
+              <a:t>model needs to be trained on the </a:t>
+            </a:r>
+            <a:r>
+              <a:rPr lang="en-US" sz="2000" b="1" dirty="0" smtClean="0"/>
+              <a:t>entire data</a:t>
+            </a:r>
+            <a:r>
+              <a:rPr lang="en-US" sz="2000" dirty="0" smtClean="0"/>
+              <a:t> for increasing its efficiency.</a:t>
             </a:r>
             <a:endParaRPr lang="en-US" sz="2000" dirty="0"/>
           </a:p>
@@ -10136,7 +10970,7 @@
           <a:p>
             <a:r>
               <a:rPr lang="en-US" dirty="0" smtClean="0"/>
-              <a:t>Future Work</a:t>
+              <a:t>Future Work : This Model</a:t>
             </a:r>
             <a:endParaRPr lang="en-US" dirty="0"/>
           </a:p>
@@ -10204,7 +11038,7 @@
             </a:pPr>
             <a:fld id="{D6BE58A1-A4A9-468D-9971-E4F582D1F085}" type="datetime5">
               <a:rPr lang="en-US" smtClean="0"/>
-              <a:t>15-Nov-16</a:t>
+              <a:t>3-Dec-16</a:t>
             </a:fld>
             <a:endParaRPr lang="en-US"/>
           </a:p>

</xml_diff>